<commit_message>
done the php unit ppt
</commit_message>
<xml_diff>
--- a/OOP/Final/Lecture/Week_13_Unit_Testing_PHPUnit.pptx
+++ b/OOP/Final/Lecture/Week_13_Unit_Testing_PHPUnit.pptx
@@ -5,7 +5,7 @@
     <p:sldMasterId id="2147483648" r:id="rId1"/>
   </p:sldMasterIdLst>
   <p:notesMasterIdLst>
-    <p:notesMasterId r:id="rId13"/>
+    <p:notesMasterId r:id="rId15"/>
   </p:notesMasterIdLst>
   <p:sldIdLst>
     <p:sldId id="256" r:id="rId2"/>
@@ -15,10 +15,12 @@
     <p:sldId id="267" r:id="rId6"/>
     <p:sldId id="268" r:id="rId7"/>
     <p:sldId id="269" r:id="rId8"/>
-    <p:sldId id="261" r:id="rId9"/>
-    <p:sldId id="262" r:id="rId10"/>
-    <p:sldId id="263" r:id="rId11"/>
-    <p:sldId id="264" r:id="rId12"/>
+    <p:sldId id="270" r:id="rId9"/>
+    <p:sldId id="271" r:id="rId10"/>
+    <p:sldId id="272" r:id="rId11"/>
+    <p:sldId id="273" r:id="rId12"/>
+    <p:sldId id="274" r:id="rId13"/>
+    <p:sldId id="275" r:id="rId14"/>
   </p:sldIdLst>
   <p:sldSz cx="9144000" cy="6858000" type="screen4x3"/>
   <p:notesSz cx="6858000" cy="9144000"/>
@@ -218,7 +220,7 @@
           <a:p>
             <a:fld id="{4632611B-337C-40D7-9B54-08AFBE3B5EAA}" type="datetimeFigureOut">
               <a:rPr lang="en-US" smtClean="0"/>
-              <a:t>7/28/2025</a:t>
+              <a:t>7/29/2025</a:t>
             </a:fld>
             <a:endParaRPr lang="en-US"/>
           </a:p>
@@ -607,6 +609,339 @@
 </p:notes>
 </file>
 
+<file path=ppt/notesSlides/notesSlide10.xml><?xml version="1.0" encoding="utf-8"?>
+<p:notes xmlns:a="http://schemas.openxmlformats.org/drawingml/2006/main" xmlns:r="http://schemas.openxmlformats.org/officeDocument/2006/relationships" xmlns:p="http://schemas.openxmlformats.org/presentationml/2006/main">
+  <p:cSld>
+    <p:spTree>
+      <p:nvGrpSpPr>
+        <p:cNvPr id="1" name="">
+          <a:extLst>
+            <a:ext uri="{FF2B5EF4-FFF2-40B4-BE49-F238E27FC236}">
+              <a16:creationId xmlns:a16="http://schemas.microsoft.com/office/drawing/2014/main" id="{466C7846-6CBB-6682-BBC2-E93C448A2DE4}"/>
+            </a:ext>
+          </a:extLst>
+        </p:cNvPr>
+        <p:cNvGrpSpPr/>
+        <p:nvPr/>
+      </p:nvGrpSpPr>
+      <p:grpSpPr>
+        <a:xfrm>
+          <a:off x="0" y="0"/>
+          <a:ext cx="0" cy="0"/>
+          <a:chOff x="0" y="0"/>
+          <a:chExt cx="0" cy="0"/>
+        </a:xfrm>
+      </p:grpSpPr>
+      <p:sp>
+        <p:nvSpPr>
+          <p:cNvPr id="2" name="Slide Image Placeholder 1">
+            <a:extLst>
+              <a:ext uri="{FF2B5EF4-FFF2-40B4-BE49-F238E27FC236}">
+                <a16:creationId xmlns:a16="http://schemas.microsoft.com/office/drawing/2014/main" id="{63E85C9A-8975-8D84-8D9F-325DF80ED582}"/>
+              </a:ext>
+            </a:extLst>
+          </p:cNvPr>
+          <p:cNvSpPr>
+            <a:spLocks noGrp="1" noRot="1" noChangeAspect="1"/>
+          </p:cNvSpPr>
+          <p:nvPr>
+            <p:ph type="sldImg"/>
+          </p:nvPr>
+        </p:nvSpPr>
+        <p:spPr/>
+      </p:sp>
+      <p:sp>
+        <p:nvSpPr>
+          <p:cNvPr id="3" name="Notes Placeholder 2">
+            <a:extLst>
+              <a:ext uri="{FF2B5EF4-FFF2-40B4-BE49-F238E27FC236}">
+                <a16:creationId xmlns:a16="http://schemas.microsoft.com/office/drawing/2014/main" id="{51B8A346-53ED-1651-BA8D-42E743D67C3B}"/>
+              </a:ext>
+            </a:extLst>
+          </p:cNvPr>
+          <p:cNvSpPr>
+            <a:spLocks noGrp="1"/>
+          </p:cNvSpPr>
+          <p:nvPr>
+            <p:ph type="body" idx="1"/>
+          </p:nvPr>
+        </p:nvSpPr>
+        <p:spPr/>
+        <p:txBody>
+          <a:bodyPr/>
+          <a:lstStyle/>
+          <a:p>
+            <a:r>
+              <a:rPr lang="en-US" dirty="0"/>
+              <a:t>https://pguso.medium.com/a-beginners-guide-to-phpunit-writing-and-running-unit-tests-in-php-d0b23b96749f</a:t>
+            </a:r>
+          </a:p>
+        </p:txBody>
+      </p:sp>
+      <p:sp>
+        <p:nvSpPr>
+          <p:cNvPr id="4" name="Slide Number Placeholder 3">
+            <a:extLst>
+              <a:ext uri="{FF2B5EF4-FFF2-40B4-BE49-F238E27FC236}">
+                <a16:creationId xmlns:a16="http://schemas.microsoft.com/office/drawing/2014/main" id="{C617A17B-727E-E4A4-4BC8-E4EB042FFCF4}"/>
+              </a:ext>
+            </a:extLst>
+          </p:cNvPr>
+          <p:cNvSpPr>
+            <a:spLocks noGrp="1"/>
+          </p:cNvSpPr>
+          <p:nvPr>
+            <p:ph type="sldNum" sz="quarter" idx="5"/>
+          </p:nvPr>
+        </p:nvSpPr>
+        <p:spPr/>
+        <p:txBody>
+          <a:bodyPr/>
+          <a:lstStyle/>
+          <a:p>
+            <a:fld id="{497A7DF7-01B9-48AC-97D4-69187EE50AE5}" type="slidenum">
+              <a:rPr lang="en-US" smtClean="0"/>
+              <a:t>11</a:t>
+            </a:fld>
+            <a:endParaRPr lang="en-US"/>
+          </a:p>
+        </p:txBody>
+      </p:sp>
+    </p:spTree>
+    <p:extLst>
+      <p:ext uri="{BB962C8B-B14F-4D97-AF65-F5344CB8AC3E}">
+        <p14:creationId xmlns:p14="http://schemas.microsoft.com/office/powerpoint/2010/main" val="2107284150"/>
+      </p:ext>
+    </p:extLst>
+  </p:cSld>
+  <p:clrMapOvr>
+    <a:masterClrMapping/>
+  </p:clrMapOvr>
+</p:notes>
+</file>
+
+<file path=ppt/notesSlides/notesSlide11.xml><?xml version="1.0" encoding="utf-8"?>
+<p:notes xmlns:a="http://schemas.openxmlformats.org/drawingml/2006/main" xmlns:r="http://schemas.openxmlformats.org/officeDocument/2006/relationships" xmlns:p="http://schemas.openxmlformats.org/presentationml/2006/main">
+  <p:cSld>
+    <p:spTree>
+      <p:nvGrpSpPr>
+        <p:cNvPr id="1" name="">
+          <a:extLst>
+            <a:ext uri="{FF2B5EF4-FFF2-40B4-BE49-F238E27FC236}">
+              <a16:creationId xmlns:a16="http://schemas.microsoft.com/office/drawing/2014/main" id="{A689E467-E1AD-8837-685A-A5FC6739C9C8}"/>
+            </a:ext>
+          </a:extLst>
+        </p:cNvPr>
+        <p:cNvGrpSpPr/>
+        <p:nvPr/>
+      </p:nvGrpSpPr>
+      <p:grpSpPr>
+        <a:xfrm>
+          <a:off x="0" y="0"/>
+          <a:ext cx="0" cy="0"/>
+          <a:chOff x="0" y="0"/>
+          <a:chExt cx="0" cy="0"/>
+        </a:xfrm>
+      </p:grpSpPr>
+      <p:sp>
+        <p:nvSpPr>
+          <p:cNvPr id="2" name="Slide Image Placeholder 1">
+            <a:extLst>
+              <a:ext uri="{FF2B5EF4-FFF2-40B4-BE49-F238E27FC236}">
+                <a16:creationId xmlns:a16="http://schemas.microsoft.com/office/drawing/2014/main" id="{EB040B56-8E12-F1ED-09FE-4B13386C68BF}"/>
+              </a:ext>
+            </a:extLst>
+          </p:cNvPr>
+          <p:cNvSpPr>
+            <a:spLocks noGrp="1" noRot="1" noChangeAspect="1"/>
+          </p:cNvSpPr>
+          <p:nvPr>
+            <p:ph type="sldImg"/>
+          </p:nvPr>
+        </p:nvSpPr>
+        <p:spPr/>
+      </p:sp>
+      <p:sp>
+        <p:nvSpPr>
+          <p:cNvPr id="3" name="Notes Placeholder 2">
+            <a:extLst>
+              <a:ext uri="{FF2B5EF4-FFF2-40B4-BE49-F238E27FC236}">
+                <a16:creationId xmlns:a16="http://schemas.microsoft.com/office/drawing/2014/main" id="{13CE25DE-14AC-8055-525C-68FFF8A999FE}"/>
+              </a:ext>
+            </a:extLst>
+          </p:cNvPr>
+          <p:cNvSpPr>
+            <a:spLocks noGrp="1"/>
+          </p:cNvSpPr>
+          <p:nvPr>
+            <p:ph type="body" idx="1"/>
+          </p:nvPr>
+        </p:nvSpPr>
+        <p:spPr/>
+        <p:txBody>
+          <a:bodyPr/>
+          <a:lstStyle/>
+          <a:p>
+            <a:r>
+              <a:rPr lang="en-US" dirty="0"/>
+              <a:t>https://pguso.medium.com/a-beginners-guide-to-phpunit-writing-and-running-unit-tests-in-php-d0b23b96749f</a:t>
+            </a:r>
+          </a:p>
+        </p:txBody>
+      </p:sp>
+      <p:sp>
+        <p:nvSpPr>
+          <p:cNvPr id="4" name="Slide Number Placeholder 3">
+            <a:extLst>
+              <a:ext uri="{FF2B5EF4-FFF2-40B4-BE49-F238E27FC236}">
+                <a16:creationId xmlns:a16="http://schemas.microsoft.com/office/drawing/2014/main" id="{4383283D-8AE2-BB54-8520-8688C890B85D}"/>
+              </a:ext>
+            </a:extLst>
+          </p:cNvPr>
+          <p:cNvSpPr>
+            <a:spLocks noGrp="1"/>
+          </p:cNvSpPr>
+          <p:nvPr>
+            <p:ph type="sldNum" sz="quarter" idx="5"/>
+          </p:nvPr>
+        </p:nvSpPr>
+        <p:spPr/>
+        <p:txBody>
+          <a:bodyPr/>
+          <a:lstStyle/>
+          <a:p>
+            <a:fld id="{497A7DF7-01B9-48AC-97D4-69187EE50AE5}" type="slidenum">
+              <a:rPr lang="en-US" smtClean="0"/>
+              <a:t>12</a:t>
+            </a:fld>
+            <a:endParaRPr lang="en-US"/>
+          </a:p>
+        </p:txBody>
+      </p:sp>
+    </p:spTree>
+    <p:extLst>
+      <p:ext uri="{BB962C8B-B14F-4D97-AF65-F5344CB8AC3E}">
+        <p14:creationId xmlns:p14="http://schemas.microsoft.com/office/powerpoint/2010/main" val="1689870333"/>
+      </p:ext>
+    </p:extLst>
+  </p:cSld>
+  <p:clrMapOvr>
+    <a:masterClrMapping/>
+  </p:clrMapOvr>
+</p:notes>
+</file>
+
+<file path=ppt/notesSlides/notesSlide12.xml><?xml version="1.0" encoding="utf-8"?>
+<p:notes xmlns:a="http://schemas.openxmlformats.org/drawingml/2006/main" xmlns:r="http://schemas.openxmlformats.org/officeDocument/2006/relationships" xmlns:p="http://schemas.openxmlformats.org/presentationml/2006/main">
+  <p:cSld>
+    <p:spTree>
+      <p:nvGrpSpPr>
+        <p:cNvPr id="1" name="">
+          <a:extLst>
+            <a:ext uri="{FF2B5EF4-FFF2-40B4-BE49-F238E27FC236}">
+              <a16:creationId xmlns:a16="http://schemas.microsoft.com/office/drawing/2014/main" id="{F0E7A4D7-448C-1182-04BB-6CC30EF4DBBD}"/>
+            </a:ext>
+          </a:extLst>
+        </p:cNvPr>
+        <p:cNvGrpSpPr/>
+        <p:nvPr/>
+      </p:nvGrpSpPr>
+      <p:grpSpPr>
+        <a:xfrm>
+          <a:off x="0" y="0"/>
+          <a:ext cx="0" cy="0"/>
+          <a:chOff x="0" y="0"/>
+          <a:chExt cx="0" cy="0"/>
+        </a:xfrm>
+      </p:grpSpPr>
+      <p:sp>
+        <p:nvSpPr>
+          <p:cNvPr id="2" name="Slide Image Placeholder 1">
+            <a:extLst>
+              <a:ext uri="{FF2B5EF4-FFF2-40B4-BE49-F238E27FC236}">
+                <a16:creationId xmlns:a16="http://schemas.microsoft.com/office/drawing/2014/main" id="{B4AFA7A7-17B7-E3DE-FCAA-877DC7CD8B8C}"/>
+              </a:ext>
+            </a:extLst>
+          </p:cNvPr>
+          <p:cNvSpPr>
+            <a:spLocks noGrp="1" noRot="1" noChangeAspect="1"/>
+          </p:cNvSpPr>
+          <p:nvPr>
+            <p:ph type="sldImg"/>
+          </p:nvPr>
+        </p:nvSpPr>
+        <p:spPr/>
+      </p:sp>
+      <p:sp>
+        <p:nvSpPr>
+          <p:cNvPr id="3" name="Notes Placeholder 2">
+            <a:extLst>
+              <a:ext uri="{FF2B5EF4-FFF2-40B4-BE49-F238E27FC236}">
+                <a16:creationId xmlns:a16="http://schemas.microsoft.com/office/drawing/2014/main" id="{9CECC5E5-0E98-B2EF-7FDC-11DC9FFA18A1}"/>
+              </a:ext>
+            </a:extLst>
+          </p:cNvPr>
+          <p:cNvSpPr>
+            <a:spLocks noGrp="1"/>
+          </p:cNvSpPr>
+          <p:nvPr>
+            <p:ph type="body" idx="1"/>
+          </p:nvPr>
+        </p:nvSpPr>
+        <p:spPr/>
+        <p:txBody>
+          <a:bodyPr/>
+          <a:lstStyle/>
+          <a:p>
+            <a:r>
+              <a:rPr lang="en-US" dirty="0"/>
+              <a:t>https://pguso.medium.com/a-beginners-guide-to-phpunit-writing-and-running-unit-tests-in-php-d0b23b96749f</a:t>
+            </a:r>
+          </a:p>
+        </p:txBody>
+      </p:sp>
+      <p:sp>
+        <p:nvSpPr>
+          <p:cNvPr id="4" name="Slide Number Placeholder 3">
+            <a:extLst>
+              <a:ext uri="{FF2B5EF4-FFF2-40B4-BE49-F238E27FC236}">
+                <a16:creationId xmlns:a16="http://schemas.microsoft.com/office/drawing/2014/main" id="{0F48BB71-0019-4E6E-9C83-9F9941232C36}"/>
+              </a:ext>
+            </a:extLst>
+          </p:cNvPr>
+          <p:cNvSpPr>
+            <a:spLocks noGrp="1"/>
+          </p:cNvSpPr>
+          <p:nvPr>
+            <p:ph type="sldNum" sz="quarter" idx="5"/>
+          </p:nvPr>
+        </p:nvSpPr>
+        <p:spPr/>
+        <p:txBody>
+          <a:bodyPr/>
+          <a:lstStyle/>
+          <a:p>
+            <a:fld id="{497A7DF7-01B9-48AC-97D4-69187EE50AE5}" type="slidenum">
+              <a:rPr lang="en-US" smtClean="0"/>
+              <a:t>13</a:t>
+            </a:fld>
+            <a:endParaRPr lang="en-US"/>
+          </a:p>
+        </p:txBody>
+      </p:sp>
+    </p:spTree>
+    <p:extLst>
+      <p:ext uri="{BB962C8B-B14F-4D97-AF65-F5344CB8AC3E}">
+        <p14:creationId xmlns:p14="http://schemas.microsoft.com/office/powerpoint/2010/main" val="4256728707"/>
+      </p:ext>
+    </p:extLst>
+  </p:cSld>
+  <p:clrMapOvr>
+    <a:masterClrMapping/>
+  </p:clrMapOvr>
+</p:notes>
+</file>
+
 <file path=ppt/notesSlides/notesSlide2.xml><?xml version="1.0" encoding="utf-8"?>
 <p:notes xmlns:a="http://schemas.openxmlformats.org/drawingml/2006/main" xmlns:r="http://schemas.openxmlformats.org/officeDocument/2006/relationships" xmlns:p="http://schemas.openxmlformats.org/presentationml/2006/main">
   <p:cSld>
@@ -1470,6 +1805,390 @@
     <p:extLst>
       <p:ext uri="{BB962C8B-B14F-4D97-AF65-F5344CB8AC3E}">
         <p14:creationId xmlns:p14="http://schemas.microsoft.com/office/powerpoint/2010/main" val="1722212999"/>
+      </p:ext>
+    </p:extLst>
+  </p:cSld>
+  <p:clrMapOvr>
+    <a:masterClrMapping/>
+  </p:clrMapOvr>
+</p:notes>
+</file>
+
+<file path=ppt/notesSlides/notesSlide7.xml><?xml version="1.0" encoding="utf-8"?>
+<p:notes xmlns:a="http://schemas.openxmlformats.org/drawingml/2006/main" xmlns:r="http://schemas.openxmlformats.org/officeDocument/2006/relationships" xmlns:p="http://schemas.openxmlformats.org/presentationml/2006/main">
+  <p:cSld>
+    <p:spTree>
+      <p:nvGrpSpPr>
+        <p:cNvPr id="1" name="">
+          <a:extLst>
+            <a:ext uri="{FF2B5EF4-FFF2-40B4-BE49-F238E27FC236}">
+              <a16:creationId xmlns:a16="http://schemas.microsoft.com/office/drawing/2014/main" id="{5044DEAE-3AAE-CC20-0A89-F5E66D414F45}"/>
+            </a:ext>
+          </a:extLst>
+        </p:cNvPr>
+        <p:cNvGrpSpPr/>
+        <p:nvPr/>
+      </p:nvGrpSpPr>
+      <p:grpSpPr>
+        <a:xfrm>
+          <a:off x="0" y="0"/>
+          <a:ext cx="0" cy="0"/>
+          <a:chOff x="0" y="0"/>
+          <a:chExt cx="0" cy="0"/>
+        </a:xfrm>
+      </p:grpSpPr>
+      <p:sp>
+        <p:nvSpPr>
+          <p:cNvPr id="2" name="Slide Image Placeholder 1">
+            <a:extLst>
+              <a:ext uri="{FF2B5EF4-FFF2-40B4-BE49-F238E27FC236}">
+                <a16:creationId xmlns:a16="http://schemas.microsoft.com/office/drawing/2014/main" id="{32308D2D-AD0B-152A-CC98-6AD2F22045B0}"/>
+              </a:ext>
+            </a:extLst>
+          </p:cNvPr>
+          <p:cNvSpPr>
+            <a:spLocks noGrp="1" noRot="1" noChangeAspect="1"/>
+          </p:cNvSpPr>
+          <p:nvPr>
+            <p:ph type="sldImg"/>
+          </p:nvPr>
+        </p:nvSpPr>
+        <p:spPr/>
+      </p:sp>
+      <p:sp>
+        <p:nvSpPr>
+          <p:cNvPr id="3" name="Notes Placeholder 2">
+            <a:extLst>
+              <a:ext uri="{FF2B5EF4-FFF2-40B4-BE49-F238E27FC236}">
+                <a16:creationId xmlns:a16="http://schemas.microsoft.com/office/drawing/2014/main" id="{601C4481-3F5F-7522-B4B4-648211AE01FD}"/>
+              </a:ext>
+            </a:extLst>
+          </p:cNvPr>
+          <p:cNvSpPr>
+            <a:spLocks noGrp="1"/>
+          </p:cNvSpPr>
+          <p:nvPr>
+            <p:ph type="body" idx="1"/>
+          </p:nvPr>
+        </p:nvSpPr>
+        <p:spPr/>
+        <p:txBody>
+          <a:bodyPr/>
+          <a:lstStyle/>
+          <a:p>
+            <a:r>
+              <a:rPr lang="en-US" dirty="0" err="1"/>
+              <a:t>php</a:t>
+            </a:r>
+            <a:r>
+              <a:rPr lang="en-US" dirty="0"/>
+              <a:t> vendor/bin/</a:t>
+            </a:r>
+            <a:r>
+              <a:rPr lang="en-US" dirty="0" err="1"/>
+              <a:t>phpunit</a:t>
+            </a:r>
+            <a:r>
+              <a:rPr lang="en-US" dirty="0"/>
+              <a:t> tests/</a:t>
+            </a:r>
+            <a:r>
+              <a:rPr lang="en-US" dirty="0" err="1"/>
+              <a:t>DemoTest.php</a:t>
+            </a:r>
+            <a:endParaRPr lang="en-US" dirty="0"/>
+          </a:p>
+        </p:txBody>
+      </p:sp>
+      <p:sp>
+        <p:nvSpPr>
+          <p:cNvPr id="4" name="Slide Number Placeholder 3">
+            <a:extLst>
+              <a:ext uri="{FF2B5EF4-FFF2-40B4-BE49-F238E27FC236}">
+                <a16:creationId xmlns:a16="http://schemas.microsoft.com/office/drawing/2014/main" id="{0769B6F2-553D-855B-6334-3D1342DD8CA6}"/>
+              </a:ext>
+            </a:extLst>
+          </p:cNvPr>
+          <p:cNvSpPr>
+            <a:spLocks noGrp="1"/>
+          </p:cNvSpPr>
+          <p:nvPr>
+            <p:ph type="sldNum" sz="quarter" idx="5"/>
+          </p:nvPr>
+        </p:nvSpPr>
+        <p:spPr/>
+        <p:txBody>
+          <a:bodyPr/>
+          <a:lstStyle/>
+          <a:p>
+            <a:fld id="{497A7DF7-01B9-48AC-97D4-69187EE50AE5}" type="slidenum">
+              <a:rPr lang="en-US" smtClean="0"/>
+              <a:t>8</a:t>
+            </a:fld>
+            <a:endParaRPr lang="en-US"/>
+          </a:p>
+        </p:txBody>
+      </p:sp>
+    </p:spTree>
+    <p:extLst>
+      <p:ext uri="{BB962C8B-B14F-4D97-AF65-F5344CB8AC3E}">
+        <p14:creationId xmlns:p14="http://schemas.microsoft.com/office/powerpoint/2010/main" val="3780818927"/>
+      </p:ext>
+    </p:extLst>
+  </p:cSld>
+  <p:clrMapOvr>
+    <a:masterClrMapping/>
+  </p:clrMapOvr>
+</p:notes>
+</file>
+
+<file path=ppt/notesSlides/notesSlide8.xml><?xml version="1.0" encoding="utf-8"?>
+<p:notes xmlns:a="http://schemas.openxmlformats.org/drawingml/2006/main" xmlns:r="http://schemas.openxmlformats.org/officeDocument/2006/relationships" xmlns:p="http://schemas.openxmlformats.org/presentationml/2006/main">
+  <p:cSld>
+    <p:spTree>
+      <p:nvGrpSpPr>
+        <p:cNvPr id="1" name="">
+          <a:extLst>
+            <a:ext uri="{FF2B5EF4-FFF2-40B4-BE49-F238E27FC236}">
+              <a16:creationId xmlns:a16="http://schemas.microsoft.com/office/drawing/2014/main" id="{2A1018D1-EFD5-E172-1CED-B44A7B21FB59}"/>
+            </a:ext>
+          </a:extLst>
+        </p:cNvPr>
+        <p:cNvGrpSpPr/>
+        <p:nvPr/>
+      </p:nvGrpSpPr>
+      <p:grpSpPr>
+        <a:xfrm>
+          <a:off x="0" y="0"/>
+          <a:ext cx="0" cy="0"/>
+          <a:chOff x="0" y="0"/>
+          <a:chExt cx="0" cy="0"/>
+        </a:xfrm>
+      </p:grpSpPr>
+      <p:sp>
+        <p:nvSpPr>
+          <p:cNvPr id="2" name="Slide Image Placeholder 1">
+            <a:extLst>
+              <a:ext uri="{FF2B5EF4-FFF2-40B4-BE49-F238E27FC236}">
+                <a16:creationId xmlns:a16="http://schemas.microsoft.com/office/drawing/2014/main" id="{DC71D87C-E5B9-95F1-637B-A07DD3964544}"/>
+              </a:ext>
+            </a:extLst>
+          </p:cNvPr>
+          <p:cNvSpPr>
+            <a:spLocks noGrp="1" noRot="1" noChangeAspect="1"/>
+          </p:cNvSpPr>
+          <p:nvPr>
+            <p:ph type="sldImg"/>
+          </p:nvPr>
+        </p:nvSpPr>
+        <p:spPr/>
+      </p:sp>
+      <p:sp>
+        <p:nvSpPr>
+          <p:cNvPr id="3" name="Notes Placeholder 2">
+            <a:extLst>
+              <a:ext uri="{FF2B5EF4-FFF2-40B4-BE49-F238E27FC236}">
+                <a16:creationId xmlns:a16="http://schemas.microsoft.com/office/drawing/2014/main" id="{C5CDFEB5-5B42-028D-77F4-6BE1660C2FFE}"/>
+              </a:ext>
+            </a:extLst>
+          </p:cNvPr>
+          <p:cNvSpPr>
+            <a:spLocks noGrp="1"/>
+          </p:cNvSpPr>
+          <p:nvPr>
+            <p:ph type="body" idx="1"/>
+          </p:nvPr>
+        </p:nvSpPr>
+        <p:spPr/>
+        <p:txBody>
+          <a:bodyPr/>
+          <a:lstStyle/>
+          <a:p>
+            <a:r>
+              <a:rPr lang="en-US" dirty="0" err="1"/>
+              <a:t>php</a:t>
+            </a:r>
+            <a:r>
+              <a:rPr lang="en-US" dirty="0"/>
+              <a:t> vendor/bin/</a:t>
+            </a:r>
+            <a:r>
+              <a:rPr lang="en-US" dirty="0" err="1"/>
+              <a:t>phpunit</a:t>
+            </a:r>
+            <a:r>
+              <a:rPr lang="en-US" dirty="0"/>
+              <a:t> tests/</a:t>
+            </a:r>
+            <a:r>
+              <a:rPr lang="en-US" dirty="0" err="1"/>
+              <a:t>DemoTest.php</a:t>
+            </a:r>
+            <a:endParaRPr lang="en-US" dirty="0"/>
+          </a:p>
+        </p:txBody>
+      </p:sp>
+      <p:sp>
+        <p:nvSpPr>
+          <p:cNvPr id="4" name="Slide Number Placeholder 3">
+            <a:extLst>
+              <a:ext uri="{FF2B5EF4-FFF2-40B4-BE49-F238E27FC236}">
+                <a16:creationId xmlns:a16="http://schemas.microsoft.com/office/drawing/2014/main" id="{A9DC4EFC-8683-CBB3-93E4-2B82739C24E5}"/>
+              </a:ext>
+            </a:extLst>
+          </p:cNvPr>
+          <p:cNvSpPr>
+            <a:spLocks noGrp="1"/>
+          </p:cNvSpPr>
+          <p:nvPr>
+            <p:ph type="sldNum" sz="quarter" idx="5"/>
+          </p:nvPr>
+        </p:nvSpPr>
+        <p:spPr/>
+        <p:txBody>
+          <a:bodyPr/>
+          <a:lstStyle/>
+          <a:p>
+            <a:fld id="{497A7DF7-01B9-48AC-97D4-69187EE50AE5}" type="slidenum">
+              <a:rPr lang="en-US" smtClean="0"/>
+              <a:t>9</a:t>
+            </a:fld>
+            <a:endParaRPr lang="en-US"/>
+          </a:p>
+        </p:txBody>
+      </p:sp>
+    </p:spTree>
+    <p:extLst>
+      <p:ext uri="{BB962C8B-B14F-4D97-AF65-F5344CB8AC3E}">
+        <p14:creationId xmlns:p14="http://schemas.microsoft.com/office/powerpoint/2010/main" val="3140620598"/>
+      </p:ext>
+    </p:extLst>
+  </p:cSld>
+  <p:clrMapOvr>
+    <a:masterClrMapping/>
+  </p:clrMapOvr>
+</p:notes>
+</file>
+
+<file path=ppt/notesSlides/notesSlide9.xml><?xml version="1.0" encoding="utf-8"?>
+<p:notes xmlns:a="http://schemas.openxmlformats.org/drawingml/2006/main" xmlns:r="http://schemas.openxmlformats.org/officeDocument/2006/relationships" xmlns:p="http://schemas.openxmlformats.org/presentationml/2006/main">
+  <p:cSld>
+    <p:spTree>
+      <p:nvGrpSpPr>
+        <p:cNvPr id="1" name="">
+          <a:extLst>
+            <a:ext uri="{FF2B5EF4-FFF2-40B4-BE49-F238E27FC236}">
+              <a16:creationId xmlns:a16="http://schemas.microsoft.com/office/drawing/2014/main" id="{05C5DB56-C4FB-FB2D-6AEB-004F0FC06C41}"/>
+            </a:ext>
+          </a:extLst>
+        </p:cNvPr>
+        <p:cNvGrpSpPr/>
+        <p:nvPr/>
+      </p:nvGrpSpPr>
+      <p:grpSpPr>
+        <a:xfrm>
+          <a:off x="0" y="0"/>
+          <a:ext cx="0" cy="0"/>
+          <a:chOff x="0" y="0"/>
+          <a:chExt cx="0" cy="0"/>
+        </a:xfrm>
+      </p:grpSpPr>
+      <p:sp>
+        <p:nvSpPr>
+          <p:cNvPr id="2" name="Slide Image Placeholder 1">
+            <a:extLst>
+              <a:ext uri="{FF2B5EF4-FFF2-40B4-BE49-F238E27FC236}">
+                <a16:creationId xmlns:a16="http://schemas.microsoft.com/office/drawing/2014/main" id="{AF3DE2F7-DCD1-0063-C2FC-5B6CC07DF622}"/>
+              </a:ext>
+            </a:extLst>
+          </p:cNvPr>
+          <p:cNvSpPr>
+            <a:spLocks noGrp="1" noRot="1" noChangeAspect="1"/>
+          </p:cNvSpPr>
+          <p:nvPr>
+            <p:ph type="sldImg"/>
+          </p:nvPr>
+        </p:nvSpPr>
+        <p:spPr/>
+      </p:sp>
+      <p:sp>
+        <p:nvSpPr>
+          <p:cNvPr id="3" name="Notes Placeholder 2">
+            <a:extLst>
+              <a:ext uri="{FF2B5EF4-FFF2-40B4-BE49-F238E27FC236}">
+                <a16:creationId xmlns:a16="http://schemas.microsoft.com/office/drawing/2014/main" id="{2C0DFA4D-57AD-02DA-C6A6-D59F0DEC6F6E}"/>
+              </a:ext>
+            </a:extLst>
+          </p:cNvPr>
+          <p:cNvSpPr>
+            <a:spLocks noGrp="1"/>
+          </p:cNvSpPr>
+          <p:nvPr>
+            <p:ph type="body" idx="1"/>
+          </p:nvPr>
+        </p:nvSpPr>
+        <p:spPr/>
+        <p:txBody>
+          <a:bodyPr/>
+          <a:lstStyle/>
+          <a:p>
+            <a:r>
+              <a:rPr lang="en-US" dirty="0" err="1"/>
+              <a:t>php</a:t>
+            </a:r>
+            <a:r>
+              <a:rPr lang="en-US" dirty="0"/>
+              <a:t> vendor/bin/</a:t>
+            </a:r>
+            <a:r>
+              <a:rPr lang="en-US" dirty="0" err="1"/>
+              <a:t>phpunit</a:t>
+            </a:r>
+            <a:r>
+              <a:rPr lang="en-US" dirty="0"/>
+              <a:t> tests/</a:t>
+            </a:r>
+            <a:r>
+              <a:rPr lang="en-US" dirty="0" err="1"/>
+              <a:t>DemoTest.php</a:t>
+            </a:r>
+            <a:endParaRPr lang="en-US" dirty="0"/>
+          </a:p>
+        </p:txBody>
+      </p:sp>
+      <p:sp>
+        <p:nvSpPr>
+          <p:cNvPr id="4" name="Slide Number Placeholder 3">
+            <a:extLst>
+              <a:ext uri="{FF2B5EF4-FFF2-40B4-BE49-F238E27FC236}">
+                <a16:creationId xmlns:a16="http://schemas.microsoft.com/office/drawing/2014/main" id="{FA470144-E82A-599A-7098-30F930D0CE94}"/>
+              </a:ext>
+            </a:extLst>
+          </p:cNvPr>
+          <p:cNvSpPr>
+            <a:spLocks noGrp="1"/>
+          </p:cNvSpPr>
+          <p:nvPr>
+            <p:ph type="sldNum" sz="quarter" idx="5"/>
+          </p:nvPr>
+        </p:nvSpPr>
+        <p:spPr/>
+        <p:txBody>
+          <a:bodyPr/>
+          <a:lstStyle/>
+          <a:p>
+            <a:fld id="{497A7DF7-01B9-48AC-97D4-69187EE50AE5}" type="slidenum">
+              <a:rPr lang="en-US" smtClean="0"/>
+              <a:t>10</a:t>
+            </a:fld>
+            <a:endParaRPr lang="en-US"/>
+          </a:p>
+        </p:txBody>
+      </p:sp>
+    </p:spTree>
+    <p:extLst>
+      <p:ext uri="{BB962C8B-B14F-4D97-AF65-F5344CB8AC3E}">
+        <p14:creationId xmlns:p14="http://schemas.microsoft.com/office/powerpoint/2010/main" val="1635495429"/>
       </p:ext>
     </p:extLst>
   </p:cSld>
@@ -1658,7 +2377,7 @@
           <a:p>
             <a:fld id="{5BCAD085-E8A6-8845-BD4E-CB4CCA059FC4}" type="datetimeFigureOut">
               <a:rPr lang="en-US" smtClean="0"/>
-              <a:t>7/28/2025</a:t>
+              <a:t>7/29/2025</a:t>
             </a:fld>
             <a:endParaRPr lang="en-US"/>
           </a:p>
@@ -1826,7 +2545,7 @@
           <a:p>
             <a:fld id="{5BCAD085-E8A6-8845-BD4E-CB4CCA059FC4}" type="datetimeFigureOut">
               <a:rPr lang="en-US" smtClean="0"/>
-              <a:t>7/28/2025</a:t>
+              <a:t>7/29/2025</a:t>
             </a:fld>
             <a:endParaRPr lang="en-US"/>
           </a:p>
@@ -2004,7 +2723,7 @@
           <a:p>
             <a:fld id="{5BCAD085-E8A6-8845-BD4E-CB4CCA059FC4}" type="datetimeFigureOut">
               <a:rPr lang="en-US" smtClean="0"/>
-              <a:t>7/28/2025</a:t>
+              <a:t>7/29/2025</a:t>
             </a:fld>
             <a:endParaRPr lang="en-US"/>
           </a:p>
@@ -2172,7 +2891,7 @@
           <a:p>
             <a:fld id="{5BCAD085-E8A6-8845-BD4E-CB4CCA059FC4}" type="datetimeFigureOut">
               <a:rPr lang="en-US" smtClean="0"/>
-              <a:t>7/28/2025</a:t>
+              <a:t>7/29/2025</a:t>
             </a:fld>
             <a:endParaRPr lang="en-US"/>
           </a:p>
@@ -2417,7 +3136,7 @@
           <a:p>
             <a:fld id="{5BCAD085-E8A6-8845-BD4E-CB4CCA059FC4}" type="datetimeFigureOut">
               <a:rPr lang="en-US" smtClean="0"/>
-              <a:t>7/28/2025</a:t>
+              <a:t>7/29/2025</a:t>
             </a:fld>
             <a:endParaRPr lang="en-US"/>
           </a:p>
@@ -2702,7 +3421,7 @@
           <a:p>
             <a:fld id="{5BCAD085-E8A6-8845-BD4E-CB4CCA059FC4}" type="datetimeFigureOut">
               <a:rPr lang="en-US" smtClean="0"/>
-              <a:t>7/28/2025</a:t>
+              <a:t>7/29/2025</a:t>
             </a:fld>
             <a:endParaRPr lang="en-US"/>
           </a:p>
@@ -3121,7 +3840,7 @@
           <a:p>
             <a:fld id="{5BCAD085-E8A6-8845-BD4E-CB4CCA059FC4}" type="datetimeFigureOut">
               <a:rPr lang="en-US" smtClean="0"/>
-              <a:t>7/28/2025</a:t>
+              <a:t>7/29/2025</a:t>
             </a:fld>
             <a:endParaRPr lang="en-US"/>
           </a:p>
@@ -3238,7 +3957,7 @@
           <a:p>
             <a:fld id="{5BCAD085-E8A6-8845-BD4E-CB4CCA059FC4}" type="datetimeFigureOut">
               <a:rPr lang="en-US" smtClean="0"/>
-              <a:t>7/28/2025</a:t>
+              <a:t>7/29/2025</a:t>
             </a:fld>
             <a:endParaRPr lang="en-US"/>
           </a:p>
@@ -3333,7 +4052,7 @@
           <a:p>
             <a:fld id="{5BCAD085-E8A6-8845-BD4E-CB4CCA059FC4}" type="datetimeFigureOut">
               <a:rPr lang="en-US" smtClean="0"/>
-              <a:t>7/28/2025</a:t>
+              <a:t>7/29/2025</a:t>
             </a:fld>
             <a:endParaRPr lang="en-US"/>
           </a:p>
@@ -3608,7 +4327,7 @@
           <a:p>
             <a:fld id="{5BCAD085-E8A6-8845-BD4E-CB4CCA059FC4}" type="datetimeFigureOut">
               <a:rPr lang="en-US" smtClean="0"/>
-              <a:t>7/28/2025</a:t>
+              <a:t>7/29/2025</a:t>
             </a:fld>
             <a:endParaRPr lang="en-US"/>
           </a:p>
@@ -3860,7 +4579,7 @@
           <a:p>
             <a:fld id="{5BCAD085-E8A6-8845-BD4E-CB4CCA059FC4}" type="datetimeFigureOut">
               <a:rPr lang="en-US" smtClean="0"/>
-              <a:t>7/28/2025</a:t>
+              <a:t>7/29/2025</a:t>
             </a:fld>
             <a:endParaRPr lang="en-US"/>
           </a:p>
@@ -4071,7 +4790,7 @@
           <a:p>
             <a:fld id="{5BCAD085-E8A6-8845-BD4E-CB4CCA059FC4}" type="datetimeFigureOut">
               <a:rPr lang="en-US" smtClean="0"/>
-              <a:t>7/28/2025</a:t>
+              <a:t>7/29/2025</a:t>
             </a:fld>
             <a:endParaRPr lang="en-US"/>
           </a:p>
@@ -5071,9 +5790,23 @@
 <file path=ppt/slides/slide10.xml><?xml version="1.0" encoding="utf-8"?>
 <p:sld xmlns:a="http://schemas.openxmlformats.org/drawingml/2006/main" xmlns:r="http://schemas.openxmlformats.org/officeDocument/2006/relationships" xmlns:p="http://schemas.openxmlformats.org/presentationml/2006/main">
   <p:cSld>
+    <p:bg>
+      <p:bgPr>
+        <a:solidFill>
+          <a:schemeClr val="bg1"/>
+        </a:solidFill>
+        <a:effectLst/>
+      </p:bgPr>
+    </p:bg>
     <p:spTree>
       <p:nvGrpSpPr>
-        <p:cNvPr id="1" name=""/>
+        <p:cNvPr id="1" name="">
+          <a:extLst>
+            <a:ext uri="{FF2B5EF4-FFF2-40B4-BE49-F238E27FC236}">
+              <a16:creationId xmlns:a16="http://schemas.microsoft.com/office/drawing/2014/main" id="{58DAB1F1-05E6-C78F-F913-4C4ABB078164}"/>
+            </a:ext>
+          </a:extLst>
+        </p:cNvPr>
         <p:cNvGrpSpPr/>
         <p:nvPr/>
       </p:nvGrpSpPr>
@@ -5085,9 +5818,264 @@
           <a:chExt cx="0" cy="0"/>
         </a:xfrm>
       </p:grpSpPr>
-      <p:sp>
-        <p:nvSpPr>
-          <p:cNvPr id="2" name="Title 1"/>
+      <p:sp useBgFill="1">
+        <p:nvSpPr>
+          <p:cNvPr id="8" name="Rectangle 7">
+            <a:extLst>
+              <a:ext uri="{FF2B5EF4-FFF2-40B4-BE49-F238E27FC236}">
+                <a16:creationId xmlns:a16="http://schemas.microsoft.com/office/drawing/2014/main" id="{EB29092D-019E-DF80-0096-FF92DCEAEFCC}"/>
+              </a:ext>
+              <a:ext uri="{C183D7F6-B498-43B3-948B-1728B52AA6E4}">
+                <adec:decorative xmlns:adec="http://schemas.microsoft.com/office/drawing/2017/decorative" val="1"/>
+              </a:ext>
+            </a:extLst>
+          </p:cNvPr>
+          <p:cNvSpPr>
+            <a:spLocks noGrp="1" noRot="1" noChangeAspect="1" noMove="1" noResize="1" noEditPoints="1" noAdjustHandles="1" noChangeArrowheads="1" noChangeShapeType="1" noTextEdit="1"/>
+          </p:cNvSpPr>
+          <p:nvPr>
+            <p:extLst>
+              <p:ext uri="{386F3935-93C4-4BCD-93E2-E3B085C9AB24}">
+                <p16:designElem xmlns:p16="http://schemas.microsoft.com/office/powerpoint/2015/main" val="1"/>
+              </p:ext>
+            </p:extLst>
+          </p:nvPr>
+        </p:nvSpPr>
+        <p:spPr>
+          <a:xfrm>
+            <a:off x="0" y="0"/>
+            <a:ext cx="9144000" cy="6858000"/>
+          </a:xfrm>
+          <a:prstGeom prst="rect">
+            <a:avLst/>
+          </a:prstGeom>
+          <a:ln>
+            <a:noFill/>
+          </a:ln>
+        </p:spPr>
+        <p:style>
+          <a:lnRef idx="2">
+            <a:schemeClr val="accent1">
+              <a:shade val="50000"/>
+            </a:schemeClr>
+          </a:lnRef>
+          <a:fillRef idx="1">
+            <a:schemeClr val="accent1"/>
+          </a:fillRef>
+          <a:effectRef idx="0">
+            <a:schemeClr val="accent1"/>
+          </a:effectRef>
+          <a:fontRef idx="minor">
+            <a:schemeClr val="lt1"/>
+          </a:fontRef>
+        </p:style>
+        <p:txBody>
+          <a:bodyPr rtlCol="0" anchor="ctr"/>
+          <a:lstStyle/>
+          <a:p>
+            <a:pPr algn="ctr"/>
+            <a:endParaRPr lang="en-US"/>
+          </a:p>
+        </p:txBody>
+      </p:sp>
+      <p:sp useBgFill="1">
+        <p:nvSpPr>
+          <p:cNvPr id="10" name="Rectangle 9">
+            <a:extLst>
+              <a:ext uri="{FF2B5EF4-FFF2-40B4-BE49-F238E27FC236}">
+                <a16:creationId xmlns:a16="http://schemas.microsoft.com/office/drawing/2014/main" id="{EF92E9CE-6A5A-B83F-4231-2E420A19044E}"/>
+              </a:ext>
+              <a:ext uri="{C183D7F6-B498-43B3-948B-1728B52AA6E4}">
+                <adec:decorative xmlns:adec="http://schemas.microsoft.com/office/drawing/2017/decorative" val="1"/>
+              </a:ext>
+            </a:extLst>
+          </p:cNvPr>
+          <p:cNvSpPr>
+            <a:spLocks noGrp="1" noRot="1" noChangeAspect="1" noMove="1" noResize="1" noEditPoints="1" noAdjustHandles="1" noChangeArrowheads="1" noChangeShapeType="1" noTextEdit="1"/>
+          </p:cNvSpPr>
+          <p:nvPr>
+            <p:extLst>
+              <p:ext uri="{386F3935-93C4-4BCD-93E2-E3B085C9AB24}">
+                <p16:designElem xmlns:p16="http://schemas.microsoft.com/office/powerpoint/2015/main" val="1"/>
+              </p:ext>
+            </p:extLst>
+          </p:nvPr>
+        </p:nvSpPr>
+        <p:spPr>
+          <a:xfrm>
+            <a:off x="418656" y="0"/>
+            <a:ext cx="8375586" cy="2018806"/>
+          </a:xfrm>
+          <a:prstGeom prst="rect">
+            <a:avLst/>
+          </a:prstGeom>
+          <a:ln w="9525">
+            <a:solidFill>
+              <a:srgbClr val="E1E1E1"/>
+            </a:solidFill>
+          </a:ln>
+          <a:effectLst>
+            <a:outerShdw blurRad="50800" dist="38100" dir="2700000" algn="tl" rotWithShape="0">
+              <a:schemeClr val="bg1">
+                <a:lumMod val="85000"/>
+                <a:alpha val="50000"/>
+              </a:schemeClr>
+            </a:outerShdw>
+          </a:effectLst>
+        </p:spPr>
+        <p:style>
+          <a:lnRef idx="2">
+            <a:schemeClr val="accent1">
+              <a:shade val="50000"/>
+            </a:schemeClr>
+          </a:lnRef>
+          <a:fillRef idx="1">
+            <a:schemeClr val="accent1"/>
+          </a:fillRef>
+          <a:effectRef idx="0">
+            <a:schemeClr val="accent1"/>
+          </a:effectRef>
+          <a:fontRef idx="minor">
+            <a:schemeClr val="lt1"/>
+          </a:fontRef>
+        </p:style>
+        <p:txBody>
+          <a:bodyPr rtlCol="0" anchor="ctr"/>
+          <a:lstStyle/>
+          <a:p>
+            <a:pPr marL="0" marR="0" lvl="0" indent="0" algn="ctr" defTabSz="914400" rtl="0" eaLnBrk="1" fontAlgn="auto" latinLnBrk="0" hangingPunct="1">
+              <a:lnSpc>
+                <a:spcPct val="100000"/>
+              </a:lnSpc>
+              <a:spcBef>
+                <a:spcPts val="0"/>
+              </a:spcBef>
+              <a:spcAft>
+                <a:spcPts val="0"/>
+              </a:spcAft>
+              <a:buClrTx/>
+              <a:buSzTx/>
+              <a:buFontTx/>
+              <a:buNone/>
+              <a:tabLst/>
+              <a:defRPr/>
+            </a:pPr>
+            <a:endParaRPr kumimoji="0" lang="en-US" sz="1800" b="0" i="0" u="none" strike="noStrike" kern="1200" cap="none" spc="0" normalizeH="0" baseline="0" noProof="0">
+              <a:ln>
+                <a:noFill/>
+              </a:ln>
+              <a:solidFill>
+                <a:prstClr val="white"/>
+              </a:solidFill>
+              <a:effectLst/>
+              <a:uLnTx/>
+              <a:uFillTx/>
+              <a:latin typeface="Calibri" panose="020F0502020204030204"/>
+              <a:ea typeface="+mn-ea"/>
+              <a:cs typeface="+mn-cs"/>
+            </a:endParaRPr>
+          </a:p>
+        </p:txBody>
+      </p:sp>
+      <p:sp useBgFill="1">
+        <p:nvSpPr>
+          <p:cNvPr id="12" name="Rectangle 11">
+            <a:extLst>
+              <a:ext uri="{FF2B5EF4-FFF2-40B4-BE49-F238E27FC236}">
+                <a16:creationId xmlns:a16="http://schemas.microsoft.com/office/drawing/2014/main" id="{EFCD6F0E-72A4-61BC-FE00-B35F2EED3F71}"/>
+              </a:ext>
+              <a:ext uri="{C183D7F6-B498-43B3-948B-1728B52AA6E4}">
+                <adec:decorative xmlns:adec="http://schemas.microsoft.com/office/drawing/2017/decorative" val="1"/>
+              </a:ext>
+            </a:extLst>
+          </p:cNvPr>
+          <p:cNvSpPr>
+            <a:spLocks noGrp="1" noRot="1" noChangeAspect="1" noMove="1" noResize="1" noEditPoints="1" noAdjustHandles="1" noChangeArrowheads="1" noChangeShapeType="1" noTextEdit="1"/>
+          </p:cNvSpPr>
+          <p:nvPr>
+            <p:extLst>
+              <p:ext uri="{386F3935-93C4-4BCD-93E2-E3B085C9AB24}">
+                <p16:designElem xmlns:p16="http://schemas.microsoft.com/office/powerpoint/2015/main" val="1"/>
+              </p:ext>
+            </p:extLst>
+          </p:nvPr>
+        </p:nvSpPr>
+        <p:spPr>
+          <a:xfrm>
+            <a:off x="425196" y="0"/>
+            <a:ext cx="8366760" cy="2011680"/>
+          </a:xfrm>
+          <a:prstGeom prst="rect">
+            <a:avLst/>
+          </a:prstGeom>
+          <a:ln w="9525">
+            <a:noFill/>
+          </a:ln>
+          <a:effectLst/>
+        </p:spPr>
+        <p:style>
+          <a:lnRef idx="2">
+            <a:schemeClr val="accent1">
+              <a:shade val="50000"/>
+            </a:schemeClr>
+          </a:lnRef>
+          <a:fillRef idx="1">
+            <a:schemeClr val="accent1"/>
+          </a:fillRef>
+          <a:effectRef idx="0">
+            <a:schemeClr val="accent1"/>
+          </a:effectRef>
+          <a:fontRef idx="minor">
+            <a:schemeClr val="lt1"/>
+          </a:fontRef>
+        </p:style>
+        <p:txBody>
+          <a:bodyPr rtlCol="0" anchor="ctr"/>
+          <a:lstStyle/>
+          <a:p>
+            <a:pPr marL="0" marR="0" lvl="0" indent="0" algn="ctr" defTabSz="914400" rtl="0" eaLnBrk="1" fontAlgn="auto" latinLnBrk="0" hangingPunct="1">
+              <a:lnSpc>
+                <a:spcPct val="100000"/>
+              </a:lnSpc>
+              <a:spcBef>
+                <a:spcPts val="0"/>
+              </a:spcBef>
+              <a:spcAft>
+                <a:spcPts val="0"/>
+              </a:spcAft>
+              <a:buClrTx/>
+              <a:buSzTx/>
+              <a:buFontTx/>
+              <a:buNone/>
+              <a:tabLst/>
+              <a:defRPr/>
+            </a:pPr>
+            <a:endParaRPr kumimoji="0" lang="en-US" sz="1800" b="0" i="0" u="none" strike="noStrike" kern="1200" cap="none" spc="0" normalizeH="0" baseline="0" noProof="0">
+              <a:ln>
+                <a:noFill/>
+              </a:ln>
+              <a:solidFill>
+                <a:prstClr val="white"/>
+              </a:solidFill>
+              <a:effectLst/>
+              <a:uLnTx/>
+              <a:uFillTx/>
+              <a:latin typeface="Calibri" panose="020F0502020204030204"/>
+              <a:ea typeface="+mn-ea"/>
+              <a:cs typeface="+mn-cs"/>
+            </a:endParaRPr>
+          </a:p>
+        </p:txBody>
+      </p:sp>
+      <p:sp>
+        <p:nvSpPr>
+          <p:cNvPr id="2" name="Title 1">
+            <a:extLst>
+              <a:ext uri="{FF2B5EF4-FFF2-40B4-BE49-F238E27FC236}">
+                <a16:creationId xmlns:a16="http://schemas.microsoft.com/office/drawing/2014/main" id="{4DFB7A7B-4959-572D-5319-B9491D533CA6}"/>
+              </a:ext>
+            </a:extLst>
+          </p:cNvPr>
           <p:cNvSpPr>
             <a:spLocks noGrp="1"/>
           </p:cNvSpPr>
@@ -5095,22 +6083,104 @@
             <p:ph type="title"/>
           </p:nvPr>
         </p:nvSpPr>
-        <p:spPr/>
+        <p:spPr>
+          <a:xfrm>
+            <a:off x="888793" y="842793"/>
+            <a:ext cx="7626096" cy="1179576"/>
+          </a:xfrm>
+        </p:spPr>
         <p:txBody>
           <a:bodyPr>
-            <a:normAutofit fontScale="90000"/>
+            <a:noAutofit/>
           </a:bodyPr>
           <a:lstStyle/>
           <a:p>
-            <a:r>
-              <a:t>🚀 Test-Driven Development (TDD)</a:t>
-            </a:r>
-          </a:p>
-        </p:txBody>
-      </p:sp>
-      <p:sp>
-        <p:nvSpPr>
-          <p:cNvPr id="3" name="Content Placeholder 2"/>
+            <a:pPr fontAlgn="base"/>
+            <a:r>
+              <a:rPr lang="en-US" sz="3600" dirty="0"/>
+              <a:t> Test-Driven Development (TDD)</a:t>
+            </a:r>
+            <a:endParaRPr lang="en-US" sz="3500" dirty="0"/>
+          </a:p>
+        </p:txBody>
+      </p:sp>
+      <p:sp>
+        <p:nvSpPr>
+          <p:cNvPr id="14" name="Rectangle 13">
+            <a:extLst>
+              <a:ext uri="{FF2B5EF4-FFF2-40B4-BE49-F238E27FC236}">
+                <a16:creationId xmlns:a16="http://schemas.microsoft.com/office/drawing/2014/main" id="{592F74A9-D023-CB18-2C51-87BFA39358EA}"/>
+              </a:ext>
+              <a:ext uri="{C183D7F6-B498-43B3-948B-1728B52AA6E4}">
+                <adec:decorative xmlns:adec="http://schemas.microsoft.com/office/drawing/2017/decorative" val="1"/>
+              </a:ext>
+            </a:extLst>
+          </p:cNvPr>
+          <p:cNvSpPr>
+            <a:spLocks noGrp="1" noRot="1" noChangeAspect="1" noMove="1" noResize="1" noEditPoints="1" noAdjustHandles="1" noChangeArrowheads="1" noChangeShapeType="1" noTextEdit="1"/>
+          </p:cNvSpPr>
+          <p:nvPr>
+            <p:extLst>
+              <p:ext uri="{386F3935-93C4-4BCD-93E2-E3B085C9AB24}">
+                <p16:designElem xmlns:p16="http://schemas.microsoft.com/office/powerpoint/2015/main" val="1"/>
+              </p:ext>
+            </p:extLst>
+          </p:nvPr>
+        </p:nvSpPr>
+        <p:spPr>
+          <a:xfrm>
+            <a:off x="374125" y="758952"/>
+            <a:ext cx="96012" cy="704088"/>
+          </a:xfrm>
+          <a:prstGeom prst="rect">
+            <a:avLst/>
+          </a:prstGeom>
+          <a:solidFill>
+            <a:schemeClr val="accent2"/>
+          </a:solidFill>
+          <a:ln>
+            <a:noFill/>
+          </a:ln>
+        </p:spPr>
+        <p:style>
+          <a:lnRef idx="2">
+            <a:schemeClr val="accent1">
+              <a:shade val="50000"/>
+            </a:schemeClr>
+          </a:lnRef>
+          <a:fillRef idx="1">
+            <a:schemeClr val="accent1"/>
+          </a:fillRef>
+          <a:effectRef idx="0">
+            <a:schemeClr val="accent1"/>
+          </a:effectRef>
+          <a:fontRef idx="minor">
+            <a:schemeClr val="lt1"/>
+          </a:fontRef>
+        </p:style>
+        <p:txBody>
+          <a:bodyPr rtlCol="0" anchor="ctr"/>
+          <a:lstStyle/>
+          <a:p>
+            <a:pPr algn="ctr"/>
+            <a:endParaRPr lang="en-US">
+              <a:solidFill>
+                <a:prstClr val="white"/>
+              </a:solidFill>
+              <a:latin typeface="Calibri" panose="020F0502020204030204"/>
+            </a:endParaRPr>
+          </a:p>
+        </p:txBody>
+      </p:sp>
+      <p:sp>
+        <p:nvSpPr>
+          <p:cNvPr id="3" name="Content Placeholder 2">
+            <a:extLst>
+              <a:ext uri="{FF2B5EF4-FFF2-40B4-BE49-F238E27FC236}">
+                <a16:creationId xmlns:a16="http://schemas.microsoft.com/office/drawing/2014/main" id="{6D0CAE1F-64D8-E64C-6E5E-2DAB51E632B0}"/>
+              </a:ext>
+            </a:extLst>
+          </p:cNvPr>
           <p:cNvSpPr>
             <a:spLocks noGrp="1"/>
           </p:cNvSpPr>
@@ -5118,48 +6188,88 @@
             <p:ph idx="1"/>
           </p:nvPr>
         </p:nvSpPr>
-        <p:spPr/>
-        <p:txBody>
-          <a:bodyPr/>
-          <a:lstStyle/>
-          <a:p>
-            <a:r>
+        <p:spPr>
+          <a:xfrm>
+            <a:off x="836676" y="2481943"/>
+            <a:ext cx="7626096" cy="3695020"/>
+          </a:xfrm>
+        </p:spPr>
+        <p:txBody>
+          <a:bodyPr>
+            <a:normAutofit lnSpcReduction="10000"/>
+          </a:bodyPr>
+          <a:lstStyle/>
+          <a:p>
+            <a:pPr marL="0" indent="0">
+              <a:buNone/>
+            </a:pPr>
+            <a:r>
+              <a:rPr lang="en-US" dirty="0"/>
               <a:t>TDD: Write tests before writing code.</a:t>
             </a:r>
           </a:p>
           <a:p>
-            <a:r>
+            <a:pPr marL="0" indent="0">
+              <a:buNone/>
+            </a:pPr>
+            <a:r>
+              <a:rPr lang="en-US" dirty="0"/>
               <a:t>Cycle:</a:t>
             </a:r>
           </a:p>
           <a:p>
-            <a:r>
+            <a:pPr marL="400050" lvl="1" indent="0">
+              <a:buNone/>
+            </a:pPr>
+            <a:r>
+              <a:rPr lang="en-US" dirty="0"/>
               <a:t>1. Write a test</a:t>
             </a:r>
           </a:p>
           <a:p>
-            <a:r>
+            <a:pPr marL="400050" lvl="1" indent="0">
+              <a:buNone/>
+            </a:pPr>
+            <a:r>
+              <a:rPr lang="en-US" dirty="0"/>
               <a:t>2. Write code to pass the test</a:t>
             </a:r>
           </a:p>
           <a:p>
-            <a:r>
+            <a:pPr marL="400050" lvl="1" indent="0">
+              <a:buNone/>
+            </a:pPr>
+            <a:r>
+              <a:rPr lang="en-US" dirty="0"/>
               <a:t>3. Refactor</a:t>
             </a:r>
           </a:p>
           <a:p>
-            <a:r>
+            <a:pPr marL="400050" lvl="1" indent="0">
+              <a:buNone/>
+            </a:pPr>
+            <a:r>
+              <a:rPr lang="en-US" dirty="0"/>
               <a:t>4. Repeat</a:t>
             </a:r>
           </a:p>
           <a:p>
-            <a:r>
+            <a:pPr marL="400050" lvl="1" indent="0">
+              <a:buNone/>
+            </a:pPr>
+            <a:r>
+              <a:rPr lang="en-US" dirty="0"/>
               <a:t>Benefits: clean, purposeful, bug-free code</a:t>
             </a:r>
           </a:p>
         </p:txBody>
       </p:sp>
     </p:spTree>
+    <p:extLst>
+      <p:ext uri="{BB962C8B-B14F-4D97-AF65-F5344CB8AC3E}">
+        <p14:creationId xmlns:p14="http://schemas.microsoft.com/office/powerpoint/2010/main" val="1543004627"/>
+      </p:ext>
+    </p:extLst>
   </p:cSld>
   <p:clrMapOvr>
     <a:masterClrMapping/>
@@ -5170,9 +6280,23 @@
 <file path=ppt/slides/slide11.xml><?xml version="1.0" encoding="utf-8"?>
 <p:sld xmlns:a="http://schemas.openxmlformats.org/drawingml/2006/main" xmlns:r="http://schemas.openxmlformats.org/officeDocument/2006/relationships" xmlns:p="http://schemas.openxmlformats.org/presentationml/2006/main">
   <p:cSld>
+    <p:bg>
+      <p:bgPr>
+        <a:solidFill>
+          <a:schemeClr val="bg1"/>
+        </a:solidFill>
+        <a:effectLst/>
+      </p:bgPr>
+    </p:bg>
     <p:spTree>
       <p:nvGrpSpPr>
-        <p:cNvPr id="1" name=""/>
+        <p:cNvPr id="1" name="">
+          <a:extLst>
+            <a:ext uri="{FF2B5EF4-FFF2-40B4-BE49-F238E27FC236}">
+              <a16:creationId xmlns:a16="http://schemas.microsoft.com/office/drawing/2014/main" id="{C121DE94-06AC-CCD6-7BCD-AA1A70D4C0F3}"/>
+            </a:ext>
+          </a:extLst>
+        </p:cNvPr>
         <p:cNvGrpSpPr/>
         <p:nvPr/>
       </p:nvGrpSpPr>
@@ -5184,9 +6308,264 @@
           <a:chExt cx="0" cy="0"/>
         </a:xfrm>
       </p:grpSpPr>
-      <p:sp>
-        <p:nvSpPr>
-          <p:cNvPr id="2" name="Title 1"/>
+      <p:sp useBgFill="1">
+        <p:nvSpPr>
+          <p:cNvPr id="8" name="Rectangle 7">
+            <a:extLst>
+              <a:ext uri="{FF2B5EF4-FFF2-40B4-BE49-F238E27FC236}">
+                <a16:creationId xmlns:a16="http://schemas.microsoft.com/office/drawing/2014/main" id="{E92689C4-6591-7F9E-0624-ED468962686C}"/>
+              </a:ext>
+              <a:ext uri="{C183D7F6-B498-43B3-948B-1728B52AA6E4}">
+                <adec:decorative xmlns:adec="http://schemas.microsoft.com/office/drawing/2017/decorative" val="1"/>
+              </a:ext>
+            </a:extLst>
+          </p:cNvPr>
+          <p:cNvSpPr>
+            <a:spLocks noGrp="1" noRot="1" noChangeAspect="1" noMove="1" noResize="1" noEditPoints="1" noAdjustHandles="1" noChangeArrowheads="1" noChangeShapeType="1" noTextEdit="1"/>
+          </p:cNvSpPr>
+          <p:nvPr>
+            <p:extLst>
+              <p:ext uri="{386F3935-93C4-4BCD-93E2-E3B085C9AB24}">
+                <p16:designElem xmlns:p16="http://schemas.microsoft.com/office/powerpoint/2015/main" val="1"/>
+              </p:ext>
+            </p:extLst>
+          </p:nvPr>
+        </p:nvSpPr>
+        <p:spPr>
+          <a:xfrm>
+            <a:off x="0" y="0"/>
+            <a:ext cx="9144000" cy="6858000"/>
+          </a:xfrm>
+          <a:prstGeom prst="rect">
+            <a:avLst/>
+          </a:prstGeom>
+          <a:ln>
+            <a:noFill/>
+          </a:ln>
+        </p:spPr>
+        <p:style>
+          <a:lnRef idx="2">
+            <a:schemeClr val="accent1">
+              <a:shade val="50000"/>
+            </a:schemeClr>
+          </a:lnRef>
+          <a:fillRef idx="1">
+            <a:schemeClr val="accent1"/>
+          </a:fillRef>
+          <a:effectRef idx="0">
+            <a:schemeClr val="accent1"/>
+          </a:effectRef>
+          <a:fontRef idx="minor">
+            <a:schemeClr val="lt1"/>
+          </a:fontRef>
+        </p:style>
+        <p:txBody>
+          <a:bodyPr rtlCol="0" anchor="ctr"/>
+          <a:lstStyle/>
+          <a:p>
+            <a:pPr algn="ctr"/>
+            <a:endParaRPr lang="en-US"/>
+          </a:p>
+        </p:txBody>
+      </p:sp>
+      <p:sp useBgFill="1">
+        <p:nvSpPr>
+          <p:cNvPr id="10" name="Rectangle 9">
+            <a:extLst>
+              <a:ext uri="{FF2B5EF4-FFF2-40B4-BE49-F238E27FC236}">
+                <a16:creationId xmlns:a16="http://schemas.microsoft.com/office/drawing/2014/main" id="{5C71C0E0-E4E4-F718-ED71-CA29DFE3C795}"/>
+              </a:ext>
+              <a:ext uri="{C183D7F6-B498-43B3-948B-1728B52AA6E4}">
+                <adec:decorative xmlns:adec="http://schemas.microsoft.com/office/drawing/2017/decorative" val="1"/>
+              </a:ext>
+            </a:extLst>
+          </p:cNvPr>
+          <p:cNvSpPr>
+            <a:spLocks noGrp="1" noRot="1" noChangeAspect="1" noMove="1" noResize="1" noEditPoints="1" noAdjustHandles="1" noChangeArrowheads="1" noChangeShapeType="1" noTextEdit="1"/>
+          </p:cNvSpPr>
+          <p:nvPr>
+            <p:extLst>
+              <p:ext uri="{386F3935-93C4-4BCD-93E2-E3B085C9AB24}">
+                <p16:designElem xmlns:p16="http://schemas.microsoft.com/office/powerpoint/2015/main" val="1"/>
+              </p:ext>
+            </p:extLst>
+          </p:nvPr>
+        </p:nvSpPr>
+        <p:spPr>
+          <a:xfrm>
+            <a:off x="418656" y="0"/>
+            <a:ext cx="8375586" cy="2018806"/>
+          </a:xfrm>
+          <a:prstGeom prst="rect">
+            <a:avLst/>
+          </a:prstGeom>
+          <a:ln w="9525">
+            <a:solidFill>
+              <a:srgbClr val="E1E1E1"/>
+            </a:solidFill>
+          </a:ln>
+          <a:effectLst>
+            <a:outerShdw blurRad="50800" dist="38100" dir="2700000" algn="tl" rotWithShape="0">
+              <a:schemeClr val="bg1">
+                <a:lumMod val="85000"/>
+                <a:alpha val="50000"/>
+              </a:schemeClr>
+            </a:outerShdw>
+          </a:effectLst>
+        </p:spPr>
+        <p:style>
+          <a:lnRef idx="2">
+            <a:schemeClr val="accent1">
+              <a:shade val="50000"/>
+            </a:schemeClr>
+          </a:lnRef>
+          <a:fillRef idx="1">
+            <a:schemeClr val="accent1"/>
+          </a:fillRef>
+          <a:effectRef idx="0">
+            <a:schemeClr val="accent1"/>
+          </a:effectRef>
+          <a:fontRef idx="minor">
+            <a:schemeClr val="lt1"/>
+          </a:fontRef>
+        </p:style>
+        <p:txBody>
+          <a:bodyPr rtlCol="0" anchor="ctr"/>
+          <a:lstStyle/>
+          <a:p>
+            <a:pPr marL="0" marR="0" lvl="0" indent="0" algn="ctr" defTabSz="914400" rtl="0" eaLnBrk="1" fontAlgn="auto" latinLnBrk="0" hangingPunct="1">
+              <a:lnSpc>
+                <a:spcPct val="100000"/>
+              </a:lnSpc>
+              <a:spcBef>
+                <a:spcPts val="0"/>
+              </a:spcBef>
+              <a:spcAft>
+                <a:spcPts val="0"/>
+              </a:spcAft>
+              <a:buClrTx/>
+              <a:buSzTx/>
+              <a:buFontTx/>
+              <a:buNone/>
+              <a:tabLst/>
+              <a:defRPr/>
+            </a:pPr>
+            <a:endParaRPr kumimoji="0" lang="en-US" sz="1800" b="0" i="0" u="none" strike="noStrike" kern="1200" cap="none" spc="0" normalizeH="0" baseline="0" noProof="0">
+              <a:ln>
+                <a:noFill/>
+              </a:ln>
+              <a:solidFill>
+                <a:prstClr val="white"/>
+              </a:solidFill>
+              <a:effectLst/>
+              <a:uLnTx/>
+              <a:uFillTx/>
+              <a:latin typeface="Calibri" panose="020F0502020204030204"/>
+              <a:ea typeface="+mn-ea"/>
+              <a:cs typeface="+mn-cs"/>
+            </a:endParaRPr>
+          </a:p>
+        </p:txBody>
+      </p:sp>
+      <p:sp useBgFill="1">
+        <p:nvSpPr>
+          <p:cNvPr id="12" name="Rectangle 11">
+            <a:extLst>
+              <a:ext uri="{FF2B5EF4-FFF2-40B4-BE49-F238E27FC236}">
+                <a16:creationId xmlns:a16="http://schemas.microsoft.com/office/drawing/2014/main" id="{E8F0524F-D2F4-2BB4-A5C6-AF31E6E4B016}"/>
+              </a:ext>
+              <a:ext uri="{C183D7F6-B498-43B3-948B-1728B52AA6E4}">
+                <adec:decorative xmlns:adec="http://schemas.microsoft.com/office/drawing/2017/decorative" val="1"/>
+              </a:ext>
+            </a:extLst>
+          </p:cNvPr>
+          <p:cNvSpPr>
+            <a:spLocks noGrp="1" noRot="1" noChangeAspect="1" noMove="1" noResize="1" noEditPoints="1" noAdjustHandles="1" noChangeArrowheads="1" noChangeShapeType="1" noTextEdit="1"/>
+          </p:cNvSpPr>
+          <p:nvPr>
+            <p:extLst>
+              <p:ext uri="{386F3935-93C4-4BCD-93E2-E3B085C9AB24}">
+                <p16:designElem xmlns:p16="http://schemas.microsoft.com/office/powerpoint/2015/main" val="1"/>
+              </p:ext>
+            </p:extLst>
+          </p:nvPr>
+        </p:nvSpPr>
+        <p:spPr>
+          <a:xfrm>
+            <a:off x="425196" y="0"/>
+            <a:ext cx="8366760" cy="2011680"/>
+          </a:xfrm>
+          <a:prstGeom prst="rect">
+            <a:avLst/>
+          </a:prstGeom>
+          <a:ln w="9525">
+            <a:noFill/>
+          </a:ln>
+          <a:effectLst/>
+        </p:spPr>
+        <p:style>
+          <a:lnRef idx="2">
+            <a:schemeClr val="accent1">
+              <a:shade val="50000"/>
+            </a:schemeClr>
+          </a:lnRef>
+          <a:fillRef idx="1">
+            <a:schemeClr val="accent1"/>
+          </a:fillRef>
+          <a:effectRef idx="0">
+            <a:schemeClr val="accent1"/>
+          </a:effectRef>
+          <a:fontRef idx="minor">
+            <a:schemeClr val="lt1"/>
+          </a:fontRef>
+        </p:style>
+        <p:txBody>
+          <a:bodyPr rtlCol="0" anchor="ctr"/>
+          <a:lstStyle/>
+          <a:p>
+            <a:pPr marL="0" marR="0" lvl="0" indent="0" algn="ctr" defTabSz="914400" rtl="0" eaLnBrk="1" fontAlgn="auto" latinLnBrk="0" hangingPunct="1">
+              <a:lnSpc>
+                <a:spcPct val="100000"/>
+              </a:lnSpc>
+              <a:spcBef>
+                <a:spcPts val="0"/>
+              </a:spcBef>
+              <a:spcAft>
+                <a:spcPts val="0"/>
+              </a:spcAft>
+              <a:buClrTx/>
+              <a:buSzTx/>
+              <a:buFontTx/>
+              <a:buNone/>
+              <a:tabLst/>
+              <a:defRPr/>
+            </a:pPr>
+            <a:endParaRPr kumimoji="0" lang="en-US" sz="1800" b="0" i="0" u="none" strike="noStrike" kern="1200" cap="none" spc="0" normalizeH="0" baseline="0" noProof="0">
+              <a:ln>
+                <a:noFill/>
+              </a:ln>
+              <a:solidFill>
+                <a:prstClr val="white"/>
+              </a:solidFill>
+              <a:effectLst/>
+              <a:uLnTx/>
+              <a:uFillTx/>
+              <a:latin typeface="Calibri" panose="020F0502020204030204"/>
+              <a:ea typeface="+mn-ea"/>
+              <a:cs typeface="+mn-cs"/>
+            </a:endParaRPr>
+          </a:p>
+        </p:txBody>
+      </p:sp>
+      <p:sp>
+        <p:nvSpPr>
+          <p:cNvPr id="2" name="Title 1">
+            <a:extLst>
+              <a:ext uri="{FF2B5EF4-FFF2-40B4-BE49-F238E27FC236}">
+                <a16:creationId xmlns:a16="http://schemas.microsoft.com/office/drawing/2014/main" id="{010AF87F-C649-CB97-F56C-12ADADA70797}"/>
+              </a:ext>
+            </a:extLst>
+          </p:cNvPr>
           <p:cNvSpPr>
             <a:spLocks noGrp="1"/>
           </p:cNvSpPr>
@@ -5194,20 +6573,104 @@
             <p:ph type="title"/>
           </p:nvPr>
         </p:nvSpPr>
-        <p:spPr/>
-        <p:txBody>
-          <a:bodyPr/>
-          <a:lstStyle/>
-          <a:p>
-            <a:r>
-              <a:t>📌 Best Practices</a:t>
-            </a:r>
-          </a:p>
-        </p:txBody>
-      </p:sp>
-      <p:sp>
-        <p:nvSpPr>
-          <p:cNvPr id="3" name="Content Placeholder 2"/>
+        <p:spPr>
+          <a:xfrm>
+            <a:off x="888793" y="842793"/>
+            <a:ext cx="7626096" cy="1179576"/>
+          </a:xfrm>
+        </p:spPr>
+        <p:txBody>
+          <a:bodyPr>
+            <a:noAutofit/>
+          </a:bodyPr>
+          <a:lstStyle/>
+          <a:p>
+            <a:pPr fontAlgn="base"/>
+            <a:r>
+              <a:rPr lang="en-US" sz="3600" dirty="0"/>
+              <a:t> Best Practices</a:t>
+            </a:r>
+            <a:endParaRPr lang="en-US" sz="3500" dirty="0"/>
+          </a:p>
+        </p:txBody>
+      </p:sp>
+      <p:sp>
+        <p:nvSpPr>
+          <p:cNvPr id="14" name="Rectangle 13">
+            <a:extLst>
+              <a:ext uri="{FF2B5EF4-FFF2-40B4-BE49-F238E27FC236}">
+                <a16:creationId xmlns:a16="http://schemas.microsoft.com/office/drawing/2014/main" id="{B56AFF40-58AF-28AF-1AED-6929F916F077}"/>
+              </a:ext>
+              <a:ext uri="{C183D7F6-B498-43B3-948B-1728B52AA6E4}">
+                <adec:decorative xmlns:adec="http://schemas.microsoft.com/office/drawing/2017/decorative" val="1"/>
+              </a:ext>
+            </a:extLst>
+          </p:cNvPr>
+          <p:cNvSpPr>
+            <a:spLocks noGrp="1" noRot="1" noChangeAspect="1" noMove="1" noResize="1" noEditPoints="1" noAdjustHandles="1" noChangeArrowheads="1" noChangeShapeType="1" noTextEdit="1"/>
+          </p:cNvSpPr>
+          <p:nvPr>
+            <p:extLst>
+              <p:ext uri="{386F3935-93C4-4BCD-93E2-E3B085C9AB24}">
+                <p16:designElem xmlns:p16="http://schemas.microsoft.com/office/powerpoint/2015/main" val="1"/>
+              </p:ext>
+            </p:extLst>
+          </p:nvPr>
+        </p:nvSpPr>
+        <p:spPr>
+          <a:xfrm>
+            <a:off x="374125" y="758952"/>
+            <a:ext cx="96012" cy="704088"/>
+          </a:xfrm>
+          <a:prstGeom prst="rect">
+            <a:avLst/>
+          </a:prstGeom>
+          <a:solidFill>
+            <a:schemeClr val="accent2"/>
+          </a:solidFill>
+          <a:ln>
+            <a:noFill/>
+          </a:ln>
+        </p:spPr>
+        <p:style>
+          <a:lnRef idx="2">
+            <a:schemeClr val="accent1">
+              <a:shade val="50000"/>
+            </a:schemeClr>
+          </a:lnRef>
+          <a:fillRef idx="1">
+            <a:schemeClr val="accent1"/>
+          </a:fillRef>
+          <a:effectRef idx="0">
+            <a:schemeClr val="accent1"/>
+          </a:effectRef>
+          <a:fontRef idx="minor">
+            <a:schemeClr val="lt1"/>
+          </a:fontRef>
+        </p:style>
+        <p:txBody>
+          <a:bodyPr rtlCol="0" anchor="ctr"/>
+          <a:lstStyle/>
+          <a:p>
+            <a:pPr algn="ctr"/>
+            <a:endParaRPr lang="en-US">
+              <a:solidFill>
+                <a:prstClr val="white"/>
+              </a:solidFill>
+              <a:latin typeface="Calibri" panose="020F0502020204030204"/>
+            </a:endParaRPr>
+          </a:p>
+        </p:txBody>
+      </p:sp>
+      <p:sp>
+        <p:nvSpPr>
+          <p:cNvPr id="3" name="Content Placeholder 2">
+            <a:extLst>
+              <a:ext uri="{FF2B5EF4-FFF2-40B4-BE49-F238E27FC236}">
+                <a16:creationId xmlns:a16="http://schemas.microsoft.com/office/drawing/2014/main" id="{1177623B-EE8D-0255-3534-B1DAD135044A}"/>
+              </a:ext>
+            </a:extLst>
+          </p:cNvPr>
           <p:cNvSpPr>
             <a:spLocks noGrp="1"/>
           </p:cNvSpPr>
@@ -5215,33 +6678,987 @@
             <p:ph idx="1"/>
           </p:nvPr>
         </p:nvSpPr>
-        <p:spPr/>
-        <p:txBody>
-          <a:bodyPr/>
-          <a:lstStyle/>
-          <a:p>
-            <a:r>
-              <a:t>One test class per PHP class</a:t>
-            </a:r>
-          </a:p>
-          <a:p>
-            <a:r>
-              <a:t>Keep tests isolated</a:t>
-            </a:r>
-          </a:p>
-          <a:p>
-            <a:r>
-              <a:t>Use mocks for dependencies</a:t>
-            </a:r>
-          </a:p>
-          <a:p>
-            <a:r>
-              <a:t>Automate in CI/CD (e.g., GitHub Actions)</a:t>
+        <p:spPr>
+          <a:xfrm>
+            <a:off x="836676" y="2481943"/>
+            <a:ext cx="7626096" cy="3695020"/>
+          </a:xfrm>
+        </p:spPr>
+        <p:txBody>
+          <a:bodyPr>
+            <a:normAutofit fontScale="70000" lnSpcReduction="20000"/>
+          </a:bodyPr>
+          <a:lstStyle/>
+          <a:p>
+            <a:r>
+              <a:rPr lang="en-US" b="1" dirty="0"/>
+              <a:t>Write testable code:</a:t>
+            </a:r>
+            <a:r>
+              <a:rPr lang="en-US" dirty="0"/>
+              <a:t> Design your code with clear inputs and outputs and minimize dependencies. This makes it easier to create effective tests and ensures better test coverage.</a:t>
+            </a:r>
+          </a:p>
+          <a:p>
+            <a:r>
+              <a:rPr lang="en-US" b="1" dirty="0"/>
+              <a:t>Write small, focused tests:</a:t>
+            </a:r>
+            <a:r>
+              <a:rPr lang="en-US" dirty="0"/>
+              <a:t> Each test should target one specific functionality. This helps in isolating issues and makes debugging simpler.</a:t>
+            </a:r>
+          </a:p>
+          <a:p>
+            <a:r>
+              <a:rPr lang="en-US" b="1" dirty="0"/>
+              <a:t>Use descriptive test names:</a:t>
+            </a:r>
+            <a:r>
+              <a:rPr lang="en-US" dirty="0"/>
+              <a:t> Name your test methods clearly to reflect what they’re testing. This improves readability and helps others understand the purpose of each test.</a:t>
+            </a:r>
+          </a:p>
+          <a:p>
+            <a:r>
+              <a:rPr lang="en-US" b="1" dirty="0"/>
+              <a:t>Use assertions effectively:</a:t>
+            </a:r>
+            <a:r>
+              <a:rPr lang="en-US" dirty="0"/>
+              <a:t> Validate both expected successes and failures using appropriate assertions for the data types involved.</a:t>
             </a:r>
           </a:p>
         </p:txBody>
       </p:sp>
     </p:spTree>
+    <p:extLst>
+      <p:ext uri="{BB962C8B-B14F-4D97-AF65-F5344CB8AC3E}">
+        <p14:creationId xmlns:p14="http://schemas.microsoft.com/office/powerpoint/2010/main" val="1735793257"/>
+      </p:ext>
+    </p:extLst>
+  </p:cSld>
+  <p:clrMapOvr>
+    <a:masterClrMapping/>
+  </p:clrMapOvr>
+</p:sld>
+</file>
+
+<file path=ppt/slides/slide12.xml><?xml version="1.0" encoding="utf-8"?>
+<p:sld xmlns:a="http://schemas.openxmlformats.org/drawingml/2006/main" xmlns:r="http://schemas.openxmlformats.org/officeDocument/2006/relationships" xmlns:p="http://schemas.openxmlformats.org/presentationml/2006/main">
+  <p:cSld>
+    <p:bg>
+      <p:bgPr>
+        <a:solidFill>
+          <a:schemeClr val="bg1"/>
+        </a:solidFill>
+        <a:effectLst/>
+      </p:bgPr>
+    </p:bg>
+    <p:spTree>
+      <p:nvGrpSpPr>
+        <p:cNvPr id="1" name="">
+          <a:extLst>
+            <a:ext uri="{FF2B5EF4-FFF2-40B4-BE49-F238E27FC236}">
+              <a16:creationId xmlns:a16="http://schemas.microsoft.com/office/drawing/2014/main" id="{117F2F9B-8D8B-7DD3-BA3E-E0174309C506}"/>
+            </a:ext>
+          </a:extLst>
+        </p:cNvPr>
+        <p:cNvGrpSpPr/>
+        <p:nvPr/>
+      </p:nvGrpSpPr>
+      <p:grpSpPr>
+        <a:xfrm>
+          <a:off x="0" y="0"/>
+          <a:ext cx="0" cy="0"/>
+          <a:chOff x="0" y="0"/>
+          <a:chExt cx="0" cy="0"/>
+        </a:xfrm>
+      </p:grpSpPr>
+      <p:sp useBgFill="1">
+        <p:nvSpPr>
+          <p:cNvPr id="8" name="Rectangle 7">
+            <a:extLst>
+              <a:ext uri="{FF2B5EF4-FFF2-40B4-BE49-F238E27FC236}">
+                <a16:creationId xmlns:a16="http://schemas.microsoft.com/office/drawing/2014/main" id="{155D2F2D-CD1A-5044-BCA5-470BBD25C810}"/>
+              </a:ext>
+              <a:ext uri="{C183D7F6-B498-43B3-948B-1728B52AA6E4}">
+                <adec:decorative xmlns:adec="http://schemas.microsoft.com/office/drawing/2017/decorative" val="1"/>
+              </a:ext>
+            </a:extLst>
+          </p:cNvPr>
+          <p:cNvSpPr>
+            <a:spLocks noGrp="1" noRot="1" noChangeAspect="1" noMove="1" noResize="1" noEditPoints="1" noAdjustHandles="1" noChangeArrowheads="1" noChangeShapeType="1" noTextEdit="1"/>
+          </p:cNvSpPr>
+          <p:nvPr>
+            <p:extLst>
+              <p:ext uri="{386F3935-93C4-4BCD-93E2-E3B085C9AB24}">
+                <p16:designElem xmlns:p16="http://schemas.microsoft.com/office/powerpoint/2015/main" val="1"/>
+              </p:ext>
+            </p:extLst>
+          </p:nvPr>
+        </p:nvSpPr>
+        <p:spPr>
+          <a:xfrm>
+            <a:off x="0" y="0"/>
+            <a:ext cx="9144000" cy="6858000"/>
+          </a:xfrm>
+          <a:prstGeom prst="rect">
+            <a:avLst/>
+          </a:prstGeom>
+          <a:ln>
+            <a:noFill/>
+          </a:ln>
+        </p:spPr>
+        <p:style>
+          <a:lnRef idx="2">
+            <a:schemeClr val="accent1">
+              <a:shade val="50000"/>
+            </a:schemeClr>
+          </a:lnRef>
+          <a:fillRef idx="1">
+            <a:schemeClr val="accent1"/>
+          </a:fillRef>
+          <a:effectRef idx="0">
+            <a:schemeClr val="accent1"/>
+          </a:effectRef>
+          <a:fontRef idx="minor">
+            <a:schemeClr val="lt1"/>
+          </a:fontRef>
+        </p:style>
+        <p:txBody>
+          <a:bodyPr rtlCol="0" anchor="ctr"/>
+          <a:lstStyle/>
+          <a:p>
+            <a:pPr algn="ctr"/>
+            <a:endParaRPr lang="en-US"/>
+          </a:p>
+        </p:txBody>
+      </p:sp>
+      <p:sp useBgFill="1">
+        <p:nvSpPr>
+          <p:cNvPr id="10" name="Rectangle 9">
+            <a:extLst>
+              <a:ext uri="{FF2B5EF4-FFF2-40B4-BE49-F238E27FC236}">
+                <a16:creationId xmlns:a16="http://schemas.microsoft.com/office/drawing/2014/main" id="{1FA92997-902E-B466-44FA-758EDD3BEFBA}"/>
+              </a:ext>
+              <a:ext uri="{C183D7F6-B498-43B3-948B-1728B52AA6E4}">
+                <adec:decorative xmlns:adec="http://schemas.microsoft.com/office/drawing/2017/decorative" val="1"/>
+              </a:ext>
+            </a:extLst>
+          </p:cNvPr>
+          <p:cNvSpPr>
+            <a:spLocks noGrp="1" noRot="1" noChangeAspect="1" noMove="1" noResize="1" noEditPoints="1" noAdjustHandles="1" noChangeArrowheads="1" noChangeShapeType="1" noTextEdit="1"/>
+          </p:cNvSpPr>
+          <p:nvPr>
+            <p:extLst>
+              <p:ext uri="{386F3935-93C4-4BCD-93E2-E3B085C9AB24}">
+                <p16:designElem xmlns:p16="http://schemas.microsoft.com/office/powerpoint/2015/main" val="1"/>
+              </p:ext>
+            </p:extLst>
+          </p:nvPr>
+        </p:nvSpPr>
+        <p:spPr>
+          <a:xfrm>
+            <a:off x="418656" y="0"/>
+            <a:ext cx="8375586" cy="2018806"/>
+          </a:xfrm>
+          <a:prstGeom prst="rect">
+            <a:avLst/>
+          </a:prstGeom>
+          <a:ln w="9525">
+            <a:solidFill>
+              <a:srgbClr val="E1E1E1"/>
+            </a:solidFill>
+          </a:ln>
+          <a:effectLst>
+            <a:outerShdw blurRad="50800" dist="38100" dir="2700000" algn="tl" rotWithShape="0">
+              <a:schemeClr val="bg1">
+                <a:lumMod val="85000"/>
+                <a:alpha val="50000"/>
+              </a:schemeClr>
+            </a:outerShdw>
+          </a:effectLst>
+        </p:spPr>
+        <p:style>
+          <a:lnRef idx="2">
+            <a:schemeClr val="accent1">
+              <a:shade val="50000"/>
+            </a:schemeClr>
+          </a:lnRef>
+          <a:fillRef idx="1">
+            <a:schemeClr val="accent1"/>
+          </a:fillRef>
+          <a:effectRef idx="0">
+            <a:schemeClr val="accent1"/>
+          </a:effectRef>
+          <a:fontRef idx="minor">
+            <a:schemeClr val="lt1"/>
+          </a:fontRef>
+        </p:style>
+        <p:txBody>
+          <a:bodyPr rtlCol="0" anchor="ctr"/>
+          <a:lstStyle/>
+          <a:p>
+            <a:pPr marL="0" marR="0" lvl="0" indent="0" algn="ctr" defTabSz="914400" rtl="0" eaLnBrk="1" fontAlgn="auto" latinLnBrk="0" hangingPunct="1">
+              <a:lnSpc>
+                <a:spcPct val="100000"/>
+              </a:lnSpc>
+              <a:spcBef>
+                <a:spcPts val="0"/>
+              </a:spcBef>
+              <a:spcAft>
+                <a:spcPts val="0"/>
+              </a:spcAft>
+              <a:buClrTx/>
+              <a:buSzTx/>
+              <a:buFontTx/>
+              <a:buNone/>
+              <a:tabLst/>
+              <a:defRPr/>
+            </a:pPr>
+            <a:endParaRPr kumimoji="0" lang="en-US" sz="1800" b="0" i="0" u="none" strike="noStrike" kern="1200" cap="none" spc="0" normalizeH="0" baseline="0" noProof="0">
+              <a:ln>
+                <a:noFill/>
+              </a:ln>
+              <a:solidFill>
+                <a:prstClr val="white"/>
+              </a:solidFill>
+              <a:effectLst/>
+              <a:uLnTx/>
+              <a:uFillTx/>
+              <a:latin typeface="Calibri" panose="020F0502020204030204"/>
+              <a:ea typeface="+mn-ea"/>
+              <a:cs typeface="+mn-cs"/>
+            </a:endParaRPr>
+          </a:p>
+        </p:txBody>
+      </p:sp>
+      <p:sp useBgFill="1">
+        <p:nvSpPr>
+          <p:cNvPr id="12" name="Rectangle 11">
+            <a:extLst>
+              <a:ext uri="{FF2B5EF4-FFF2-40B4-BE49-F238E27FC236}">
+                <a16:creationId xmlns:a16="http://schemas.microsoft.com/office/drawing/2014/main" id="{4925FB6F-E062-F3F0-5198-0C9FD3ACC748}"/>
+              </a:ext>
+              <a:ext uri="{C183D7F6-B498-43B3-948B-1728B52AA6E4}">
+                <adec:decorative xmlns:adec="http://schemas.microsoft.com/office/drawing/2017/decorative" val="1"/>
+              </a:ext>
+            </a:extLst>
+          </p:cNvPr>
+          <p:cNvSpPr>
+            <a:spLocks noGrp="1" noRot="1" noChangeAspect="1" noMove="1" noResize="1" noEditPoints="1" noAdjustHandles="1" noChangeArrowheads="1" noChangeShapeType="1" noTextEdit="1"/>
+          </p:cNvSpPr>
+          <p:nvPr>
+            <p:extLst>
+              <p:ext uri="{386F3935-93C4-4BCD-93E2-E3B085C9AB24}">
+                <p16:designElem xmlns:p16="http://schemas.microsoft.com/office/powerpoint/2015/main" val="1"/>
+              </p:ext>
+            </p:extLst>
+          </p:nvPr>
+        </p:nvSpPr>
+        <p:spPr>
+          <a:xfrm>
+            <a:off x="425196" y="0"/>
+            <a:ext cx="8366760" cy="2011680"/>
+          </a:xfrm>
+          <a:prstGeom prst="rect">
+            <a:avLst/>
+          </a:prstGeom>
+          <a:ln w="9525">
+            <a:noFill/>
+          </a:ln>
+          <a:effectLst/>
+        </p:spPr>
+        <p:style>
+          <a:lnRef idx="2">
+            <a:schemeClr val="accent1">
+              <a:shade val="50000"/>
+            </a:schemeClr>
+          </a:lnRef>
+          <a:fillRef idx="1">
+            <a:schemeClr val="accent1"/>
+          </a:fillRef>
+          <a:effectRef idx="0">
+            <a:schemeClr val="accent1"/>
+          </a:effectRef>
+          <a:fontRef idx="minor">
+            <a:schemeClr val="lt1"/>
+          </a:fontRef>
+        </p:style>
+        <p:txBody>
+          <a:bodyPr rtlCol="0" anchor="ctr"/>
+          <a:lstStyle/>
+          <a:p>
+            <a:pPr marL="0" marR="0" lvl="0" indent="0" algn="ctr" defTabSz="914400" rtl="0" eaLnBrk="1" fontAlgn="auto" latinLnBrk="0" hangingPunct="1">
+              <a:lnSpc>
+                <a:spcPct val="100000"/>
+              </a:lnSpc>
+              <a:spcBef>
+                <a:spcPts val="0"/>
+              </a:spcBef>
+              <a:spcAft>
+                <a:spcPts val="0"/>
+              </a:spcAft>
+              <a:buClrTx/>
+              <a:buSzTx/>
+              <a:buFontTx/>
+              <a:buNone/>
+              <a:tabLst/>
+              <a:defRPr/>
+            </a:pPr>
+            <a:endParaRPr kumimoji="0" lang="en-US" sz="1800" b="0" i="0" u="none" strike="noStrike" kern="1200" cap="none" spc="0" normalizeH="0" baseline="0" noProof="0">
+              <a:ln>
+                <a:noFill/>
+              </a:ln>
+              <a:solidFill>
+                <a:prstClr val="white"/>
+              </a:solidFill>
+              <a:effectLst/>
+              <a:uLnTx/>
+              <a:uFillTx/>
+              <a:latin typeface="Calibri" panose="020F0502020204030204"/>
+              <a:ea typeface="+mn-ea"/>
+              <a:cs typeface="+mn-cs"/>
+            </a:endParaRPr>
+          </a:p>
+        </p:txBody>
+      </p:sp>
+      <p:sp>
+        <p:nvSpPr>
+          <p:cNvPr id="2" name="Title 1">
+            <a:extLst>
+              <a:ext uri="{FF2B5EF4-FFF2-40B4-BE49-F238E27FC236}">
+                <a16:creationId xmlns:a16="http://schemas.microsoft.com/office/drawing/2014/main" id="{59633E4F-E2DD-C798-6AC4-BB0D01B0B0F3}"/>
+              </a:ext>
+            </a:extLst>
+          </p:cNvPr>
+          <p:cNvSpPr>
+            <a:spLocks noGrp="1"/>
+          </p:cNvSpPr>
+          <p:nvPr>
+            <p:ph type="title"/>
+          </p:nvPr>
+        </p:nvSpPr>
+        <p:spPr>
+          <a:xfrm>
+            <a:off x="888793" y="842793"/>
+            <a:ext cx="7626096" cy="1179576"/>
+          </a:xfrm>
+        </p:spPr>
+        <p:txBody>
+          <a:bodyPr>
+            <a:noAutofit/>
+          </a:bodyPr>
+          <a:lstStyle/>
+          <a:p>
+            <a:pPr fontAlgn="base"/>
+            <a:r>
+              <a:rPr lang="en-US" sz="3600" dirty="0"/>
+              <a:t> Best Practices</a:t>
+            </a:r>
+            <a:endParaRPr lang="en-US" sz="3500" dirty="0"/>
+          </a:p>
+        </p:txBody>
+      </p:sp>
+      <p:sp>
+        <p:nvSpPr>
+          <p:cNvPr id="14" name="Rectangle 13">
+            <a:extLst>
+              <a:ext uri="{FF2B5EF4-FFF2-40B4-BE49-F238E27FC236}">
+                <a16:creationId xmlns:a16="http://schemas.microsoft.com/office/drawing/2014/main" id="{59830702-1CFE-9A46-1BF7-EBC58A53C998}"/>
+              </a:ext>
+              <a:ext uri="{C183D7F6-B498-43B3-948B-1728B52AA6E4}">
+                <adec:decorative xmlns:adec="http://schemas.microsoft.com/office/drawing/2017/decorative" val="1"/>
+              </a:ext>
+            </a:extLst>
+          </p:cNvPr>
+          <p:cNvSpPr>
+            <a:spLocks noGrp="1" noRot="1" noChangeAspect="1" noMove="1" noResize="1" noEditPoints="1" noAdjustHandles="1" noChangeArrowheads="1" noChangeShapeType="1" noTextEdit="1"/>
+          </p:cNvSpPr>
+          <p:nvPr>
+            <p:extLst>
+              <p:ext uri="{386F3935-93C4-4BCD-93E2-E3B085C9AB24}">
+                <p16:designElem xmlns:p16="http://schemas.microsoft.com/office/powerpoint/2015/main" val="1"/>
+              </p:ext>
+            </p:extLst>
+          </p:nvPr>
+        </p:nvSpPr>
+        <p:spPr>
+          <a:xfrm>
+            <a:off x="374125" y="758952"/>
+            <a:ext cx="96012" cy="704088"/>
+          </a:xfrm>
+          <a:prstGeom prst="rect">
+            <a:avLst/>
+          </a:prstGeom>
+          <a:solidFill>
+            <a:schemeClr val="accent2"/>
+          </a:solidFill>
+          <a:ln>
+            <a:noFill/>
+          </a:ln>
+        </p:spPr>
+        <p:style>
+          <a:lnRef idx="2">
+            <a:schemeClr val="accent1">
+              <a:shade val="50000"/>
+            </a:schemeClr>
+          </a:lnRef>
+          <a:fillRef idx="1">
+            <a:schemeClr val="accent1"/>
+          </a:fillRef>
+          <a:effectRef idx="0">
+            <a:schemeClr val="accent1"/>
+          </a:effectRef>
+          <a:fontRef idx="minor">
+            <a:schemeClr val="lt1"/>
+          </a:fontRef>
+        </p:style>
+        <p:txBody>
+          <a:bodyPr rtlCol="0" anchor="ctr"/>
+          <a:lstStyle/>
+          <a:p>
+            <a:pPr algn="ctr"/>
+            <a:endParaRPr lang="en-US">
+              <a:solidFill>
+                <a:prstClr val="white"/>
+              </a:solidFill>
+              <a:latin typeface="Calibri" panose="020F0502020204030204"/>
+            </a:endParaRPr>
+          </a:p>
+        </p:txBody>
+      </p:sp>
+      <p:sp>
+        <p:nvSpPr>
+          <p:cNvPr id="3" name="Content Placeholder 2">
+            <a:extLst>
+              <a:ext uri="{FF2B5EF4-FFF2-40B4-BE49-F238E27FC236}">
+                <a16:creationId xmlns:a16="http://schemas.microsoft.com/office/drawing/2014/main" id="{748969D7-5A5C-7BC3-3653-AD88D727FDBF}"/>
+              </a:ext>
+            </a:extLst>
+          </p:cNvPr>
+          <p:cNvSpPr>
+            <a:spLocks noGrp="1"/>
+          </p:cNvSpPr>
+          <p:nvPr>
+            <p:ph idx="1"/>
+          </p:nvPr>
+        </p:nvSpPr>
+        <p:spPr>
+          <a:xfrm>
+            <a:off x="836676" y="2481943"/>
+            <a:ext cx="7626096" cy="3695020"/>
+          </a:xfrm>
+        </p:spPr>
+        <p:txBody>
+          <a:bodyPr>
+            <a:normAutofit fontScale="62500" lnSpcReduction="20000"/>
+          </a:bodyPr>
+          <a:lstStyle/>
+          <a:p>
+            <a:r>
+              <a:rPr lang="en-US" b="1" dirty="0"/>
+              <a:t>Test edge cases and error conditions:</a:t>
+            </a:r>
+            <a:r>
+              <a:rPr lang="en-US" dirty="0"/>
+              <a:t> Check for unusual or extreme inputs such as nulls, empty arrays, or invalid data to ensure your code handles them gracefully.</a:t>
+            </a:r>
+          </a:p>
+          <a:p>
+            <a:r>
+              <a:rPr lang="en-US" b="1" dirty="0"/>
+              <a:t>Use test fixtures:</a:t>
+            </a:r>
+            <a:r>
+              <a:rPr lang="en-US" dirty="0"/>
+              <a:t> Set up reusable test data and environments to avoid repetition and keep tests consistent and clean.</a:t>
+            </a:r>
+          </a:p>
+          <a:p>
+            <a:r>
+              <a:rPr lang="en-US" b="1" dirty="0"/>
+              <a:t>Use data providers:</a:t>
+            </a:r>
+            <a:r>
+              <a:rPr lang="en-US" dirty="0"/>
+              <a:t> Test your logic with a variety of inputs to ensure it behaves correctly under different conditions.</a:t>
+            </a:r>
+          </a:p>
+          <a:p>
+            <a:r>
+              <a:rPr lang="en-US" b="1" dirty="0"/>
+              <a:t>Keep tests fast and independent:</a:t>
+            </a:r>
+            <a:r>
+              <a:rPr lang="en-US" dirty="0"/>
+              <a:t> Make sure each test runs quickly and doesn’t rely on the results of others, enabling faster feedback and easier troubleshooting.</a:t>
+            </a:r>
+          </a:p>
+          <a:p>
+            <a:r>
+              <a:rPr lang="en-US" b="1" dirty="0"/>
+              <a:t>Refactor code when necessary:</a:t>
+            </a:r>
+            <a:r>
+              <a:rPr lang="en-US" dirty="0"/>
+              <a:t> Improve your code structure to enhance testability. This might include breaking large functions into smaller ones or injecting dependencies to reduce tight coupling.</a:t>
+            </a:r>
+          </a:p>
+        </p:txBody>
+      </p:sp>
+    </p:spTree>
+    <p:extLst>
+      <p:ext uri="{BB962C8B-B14F-4D97-AF65-F5344CB8AC3E}">
+        <p14:creationId xmlns:p14="http://schemas.microsoft.com/office/powerpoint/2010/main" val="3960121519"/>
+      </p:ext>
+    </p:extLst>
+  </p:cSld>
+  <p:clrMapOvr>
+    <a:masterClrMapping/>
+  </p:clrMapOvr>
+</p:sld>
+</file>
+
+<file path=ppt/slides/slide13.xml><?xml version="1.0" encoding="utf-8"?>
+<p:sld xmlns:a="http://schemas.openxmlformats.org/drawingml/2006/main" xmlns:r="http://schemas.openxmlformats.org/officeDocument/2006/relationships" xmlns:p="http://schemas.openxmlformats.org/presentationml/2006/main">
+  <p:cSld>
+    <p:bg>
+      <p:bgPr>
+        <a:solidFill>
+          <a:schemeClr val="bg1"/>
+        </a:solidFill>
+        <a:effectLst/>
+      </p:bgPr>
+    </p:bg>
+    <p:spTree>
+      <p:nvGrpSpPr>
+        <p:cNvPr id="1" name="">
+          <a:extLst>
+            <a:ext uri="{FF2B5EF4-FFF2-40B4-BE49-F238E27FC236}">
+              <a16:creationId xmlns:a16="http://schemas.microsoft.com/office/drawing/2014/main" id="{9F7079AB-96A4-177D-5553-4E89F5A6E388}"/>
+            </a:ext>
+          </a:extLst>
+        </p:cNvPr>
+        <p:cNvGrpSpPr/>
+        <p:nvPr/>
+      </p:nvGrpSpPr>
+      <p:grpSpPr>
+        <a:xfrm>
+          <a:off x="0" y="0"/>
+          <a:ext cx="0" cy="0"/>
+          <a:chOff x="0" y="0"/>
+          <a:chExt cx="0" cy="0"/>
+        </a:xfrm>
+      </p:grpSpPr>
+      <p:sp useBgFill="1">
+        <p:nvSpPr>
+          <p:cNvPr id="8" name="Rectangle 7">
+            <a:extLst>
+              <a:ext uri="{FF2B5EF4-FFF2-40B4-BE49-F238E27FC236}">
+                <a16:creationId xmlns:a16="http://schemas.microsoft.com/office/drawing/2014/main" id="{F5CD43BF-92B8-A5F4-3CDF-6655DDD84503}"/>
+              </a:ext>
+              <a:ext uri="{C183D7F6-B498-43B3-948B-1728B52AA6E4}">
+                <adec:decorative xmlns:adec="http://schemas.microsoft.com/office/drawing/2017/decorative" val="1"/>
+              </a:ext>
+            </a:extLst>
+          </p:cNvPr>
+          <p:cNvSpPr>
+            <a:spLocks noGrp="1" noRot="1" noChangeAspect="1" noMove="1" noResize="1" noEditPoints="1" noAdjustHandles="1" noChangeArrowheads="1" noChangeShapeType="1" noTextEdit="1"/>
+          </p:cNvSpPr>
+          <p:nvPr>
+            <p:extLst>
+              <p:ext uri="{386F3935-93C4-4BCD-93E2-E3B085C9AB24}">
+                <p16:designElem xmlns:p16="http://schemas.microsoft.com/office/powerpoint/2015/main" val="1"/>
+              </p:ext>
+            </p:extLst>
+          </p:nvPr>
+        </p:nvSpPr>
+        <p:spPr>
+          <a:xfrm>
+            <a:off x="0" y="0"/>
+            <a:ext cx="9144000" cy="6858000"/>
+          </a:xfrm>
+          <a:prstGeom prst="rect">
+            <a:avLst/>
+          </a:prstGeom>
+          <a:ln>
+            <a:noFill/>
+          </a:ln>
+        </p:spPr>
+        <p:style>
+          <a:lnRef idx="2">
+            <a:schemeClr val="accent1">
+              <a:shade val="50000"/>
+            </a:schemeClr>
+          </a:lnRef>
+          <a:fillRef idx="1">
+            <a:schemeClr val="accent1"/>
+          </a:fillRef>
+          <a:effectRef idx="0">
+            <a:schemeClr val="accent1"/>
+          </a:effectRef>
+          <a:fontRef idx="minor">
+            <a:schemeClr val="lt1"/>
+          </a:fontRef>
+        </p:style>
+        <p:txBody>
+          <a:bodyPr rtlCol="0" anchor="ctr"/>
+          <a:lstStyle/>
+          <a:p>
+            <a:pPr algn="ctr"/>
+            <a:endParaRPr lang="en-US"/>
+          </a:p>
+        </p:txBody>
+      </p:sp>
+      <p:sp useBgFill="1">
+        <p:nvSpPr>
+          <p:cNvPr id="10" name="Rectangle 9">
+            <a:extLst>
+              <a:ext uri="{FF2B5EF4-FFF2-40B4-BE49-F238E27FC236}">
+                <a16:creationId xmlns:a16="http://schemas.microsoft.com/office/drawing/2014/main" id="{EA95FEB0-CC2C-C010-652A-C23E01891B87}"/>
+              </a:ext>
+              <a:ext uri="{C183D7F6-B498-43B3-948B-1728B52AA6E4}">
+                <adec:decorative xmlns:adec="http://schemas.microsoft.com/office/drawing/2017/decorative" val="1"/>
+              </a:ext>
+            </a:extLst>
+          </p:cNvPr>
+          <p:cNvSpPr>
+            <a:spLocks noGrp="1" noRot="1" noChangeAspect="1" noMove="1" noResize="1" noEditPoints="1" noAdjustHandles="1" noChangeArrowheads="1" noChangeShapeType="1" noTextEdit="1"/>
+          </p:cNvSpPr>
+          <p:nvPr>
+            <p:extLst>
+              <p:ext uri="{386F3935-93C4-4BCD-93E2-E3B085C9AB24}">
+                <p16:designElem xmlns:p16="http://schemas.microsoft.com/office/powerpoint/2015/main" val="1"/>
+              </p:ext>
+            </p:extLst>
+          </p:nvPr>
+        </p:nvSpPr>
+        <p:spPr>
+          <a:xfrm>
+            <a:off x="418656" y="0"/>
+            <a:ext cx="8375586" cy="2018806"/>
+          </a:xfrm>
+          <a:prstGeom prst="rect">
+            <a:avLst/>
+          </a:prstGeom>
+          <a:ln w="9525">
+            <a:solidFill>
+              <a:srgbClr val="E1E1E1"/>
+            </a:solidFill>
+          </a:ln>
+          <a:effectLst>
+            <a:outerShdw blurRad="50800" dist="38100" dir="2700000" algn="tl" rotWithShape="0">
+              <a:schemeClr val="bg1">
+                <a:lumMod val="85000"/>
+                <a:alpha val="50000"/>
+              </a:schemeClr>
+            </a:outerShdw>
+          </a:effectLst>
+        </p:spPr>
+        <p:style>
+          <a:lnRef idx="2">
+            <a:schemeClr val="accent1">
+              <a:shade val="50000"/>
+            </a:schemeClr>
+          </a:lnRef>
+          <a:fillRef idx="1">
+            <a:schemeClr val="accent1"/>
+          </a:fillRef>
+          <a:effectRef idx="0">
+            <a:schemeClr val="accent1"/>
+          </a:effectRef>
+          <a:fontRef idx="minor">
+            <a:schemeClr val="lt1"/>
+          </a:fontRef>
+        </p:style>
+        <p:txBody>
+          <a:bodyPr rtlCol="0" anchor="ctr"/>
+          <a:lstStyle/>
+          <a:p>
+            <a:pPr marL="0" marR="0" lvl="0" indent="0" algn="ctr" defTabSz="914400" rtl="0" eaLnBrk="1" fontAlgn="auto" latinLnBrk="0" hangingPunct="1">
+              <a:lnSpc>
+                <a:spcPct val="100000"/>
+              </a:lnSpc>
+              <a:spcBef>
+                <a:spcPts val="0"/>
+              </a:spcBef>
+              <a:spcAft>
+                <a:spcPts val="0"/>
+              </a:spcAft>
+              <a:buClrTx/>
+              <a:buSzTx/>
+              <a:buFontTx/>
+              <a:buNone/>
+              <a:tabLst/>
+              <a:defRPr/>
+            </a:pPr>
+            <a:endParaRPr kumimoji="0" lang="en-US" sz="1800" b="0" i="0" u="none" strike="noStrike" kern="1200" cap="none" spc="0" normalizeH="0" baseline="0" noProof="0">
+              <a:ln>
+                <a:noFill/>
+              </a:ln>
+              <a:solidFill>
+                <a:prstClr val="white"/>
+              </a:solidFill>
+              <a:effectLst/>
+              <a:uLnTx/>
+              <a:uFillTx/>
+              <a:latin typeface="Calibri" panose="020F0502020204030204"/>
+              <a:ea typeface="+mn-ea"/>
+              <a:cs typeface="+mn-cs"/>
+            </a:endParaRPr>
+          </a:p>
+        </p:txBody>
+      </p:sp>
+      <p:sp useBgFill="1">
+        <p:nvSpPr>
+          <p:cNvPr id="12" name="Rectangle 11">
+            <a:extLst>
+              <a:ext uri="{FF2B5EF4-FFF2-40B4-BE49-F238E27FC236}">
+                <a16:creationId xmlns:a16="http://schemas.microsoft.com/office/drawing/2014/main" id="{460FC568-1B97-321A-7487-7D320A5F5BC2}"/>
+              </a:ext>
+              <a:ext uri="{C183D7F6-B498-43B3-948B-1728B52AA6E4}">
+                <adec:decorative xmlns:adec="http://schemas.microsoft.com/office/drawing/2017/decorative" val="1"/>
+              </a:ext>
+            </a:extLst>
+          </p:cNvPr>
+          <p:cNvSpPr>
+            <a:spLocks noGrp="1" noRot="1" noChangeAspect="1" noMove="1" noResize="1" noEditPoints="1" noAdjustHandles="1" noChangeArrowheads="1" noChangeShapeType="1" noTextEdit="1"/>
+          </p:cNvSpPr>
+          <p:nvPr>
+            <p:extLst>
+              <p:ext uri="{386F3935-93C4-4BCD-93E2-E3B085C9AB24}">
+                <p16:designElem xmlns:p16="http://schemas.microsoft.com/office/powerpoint/2015/main" val="1"/>
+              </p:ext>
+            </p:extLst>
+          </p:nvPr>
+        </p:nvSpPr>
+        <p:spPr>
+          <a:xfrm>
+            <a:off x="425196" y="0"/>
+            <a:ext cx="8366760" cy="2011680"/>
+          </a:xfrm>
+          <a:prstGeom prst="rect">
+            <a:avLst/>
+          </a:prstGeom>
+          <a:ln w="9525">
+            <a:noFill/>
+          </a:ln>
+          <a:effectLst/>
+        </p:spPr>
+        <p:style>
+          <a:lnRef idx="2">
+            <a:schemeClr val="accent1">
+              <a:shade val="50000"/>
+            </a:schemeClr>
+          </a:lnRef>
+          <a:fillRef idx="1">
+            <a:schemeClr val="accent1"/>
+          </a:fillRef>
+          <a:effectRef idx="0">
+            <a:schemeClr val="accent1"/>
+          </a:effectRef>
+          <a:fontRef idx="minor">
+            <a:schemeClr val="lt1"/>
+          </a:fontRef>
+        </p:style>
+        <p:txBody>
+          <a:bodyPr rtlCol="0" anchor="ctr"/>
+          <a:lstStyle/>
+          <a:p>
+            <a:pPr marL="0" marR="0" lvl="0" indent="0" algn="ctr" defTabSz="914400" rtl="0" eaLnBrk="1" fontAlgn="auto" latinLnBrk="0" hangingPunct="1">
+              <a:lnSpc>
+                <a:spcPct val="100000"/>
+              </a:lnSpc>
+              <a:spcBef>
+                <a:spcPts val="0"/>
+              </a:spcBef>
+              <a:spcAft>
+                <a:spcPts val="0"/>
+              </a:spcAft>
+              <a:buClrTx/>
+              <a:buSzTx/>
+              <a:buFontTx/>
+              <a:buNone/>
+              <a:tabLst/>
+              <a:defRPr/>
+            </a:pPr>
+            <a:endParaRPr kumimoji="0" lang="en-US" sz="1800" b="0" i="0" u="none" strike="noStrike" kern="1200" cap="none" spc="0" normalizeH="0" baseline="0" noProof="0">
+              <a:ln>
+                <a:noFill/>
+              </a:ln>
+              <a:solidFill>
+                <a:prstClr val="white"/>
+              </a:solidFill>
+              <a:effectLst/>
+              <a:uLnTx/>
+              <a:uFillTx/>
+              <a:latin typeface="Calibri" panose="020F0502020204030204"/>
+              <a:ea typeface="+mn-ea"/>
+              <a:cs typeface="+mn-cs"/>
+            </a:endParaRPr>
+          </a:p>
+        </p:txBody>
+      </p:sp>
+      <p:sp>
+        <p:nvSpPr>
+          <p:cNvPr id="2" name="Title 1">
+            <a:extLst>
+              <a:ext uri="{FF2B5EF4-FFF2-40B4-BE49-F238E27FC236}">
+                <a16:creationId xmlns:a16="http://schemas.microsoft.com/office/drawing/2014/main" id="{08A6FEB6-0C91-B1F0-67A5-5ECF31C9E536}"/>
+              </a:ext>
+            </a:extLst>
+          </p:cNvPr>
+          <p:cNvSpPr>
+            <a:spLocks noGrp="1"/>
+          </p:cNvSpPr>
+          <p:nvPr>
+            <p:ph type="title"/>
+          </p:nvPr>
+        </p:nvSpPr>
+        <p:spPr>
+          <a:xfrm>
+            <a:off x="888793" y="842793"/>
+            <a:ext cx="7626096" cy="1179576"/>
+          </a:xfrm>
+        </p:spPr>
+        <p:txBody>
+          <a:bodyPr>
+            <a:noAutofit/>
+          </a:bodyPr>
+          <a:lstStyle/>
+          <a:p>
+            <a:pPr fontAlgn="base"/>
+            <a:r>
+              <a:rPr lang="en-US" sz="3600" dirty="0"/>
+              <a:t>Conclusion</a:t>
+            </a:r>
+            <a:endParaRPr lang="en-US" sz="3500" dirty="0"/>
+          </a:p>
+        </p:txBody>
+      </p:sp>
+      <p:sp>
+        <p:nvSpPr>
+          <p:cNvPr id="14" name="Rectangle 13">
+            <a:extLst>
+              <a:ext uri="{FF2B5EF4-FFF2-40B4-BE49-F238E27FC236}">
+                <a16:creationId xmlns:a16="http://schemas.microsoft.com/office/drawing/2014/main" id="{466C52B8-49FA-26E2-5838-03FDEDA78ED3}"/>
+              </a:ext>
+              <a:ext uri="{C183D7F6-B498-43B3-948B-1728B52AA6E4}">
+                <adec:decorative xmlns:adec="http://schemas.microsoft.com/office/drawing/2017/decorative" val="1"/>
+              </a:ext>
+            </a:extLst>
+          </p:cNvPr>
+          <p:cNvSpPr>
+            <a:spLocks noGrp="1" noRot="1" noChangeAspect="1" noMove="1" noResize="1" noEditPoints="1" noAdjustHandles="1" noChangeArrowheads="1" noChangeShapeType="1" noTextEdit="1"/>
+          </p:cNvSpPr>
+          <p:nvPr>
+            <p:extLst>
+              <p:ext uri="{386F3935-93C4-4BCD-93E2-E3B085C9AB24}">
+                <p16:designElem xmlns:p16="http://schemas.microsoft.com/office/powerpoint/2015/main" val="1"/>
+              </p:ext>
+            </p:extLst>
+          </p:nvPr>
+        </p:nvSpPr>
+        <p:spPr>
+          <a:xfrm>
+            <a:off x="374125" y="758952"/>
+            <a:ext cx="96012" cy="704088"/>
+          </a:xfrm>
+          <a:prstGeom prst="rect">
+            <a:avLst/>
+          </a:prstGeom>
+          <a:solidFill>
+            <a:schemeClr val="accent2"/>
+          </a:solidFill>
+          <a:ln>
+            <a:noFill/>
+          </a:ln>
+        </p:spPr>
+        <p:style>
+          <a:lnRef idx="2">
+            <a:schemeClr val="accent1">
+              <a:shade val="50000"/>
+            </a:schemeClr>
+          </a:lnRef>
+          <a:fillRef idx="1">
+            <a:schemeClr val="accent1"/>
+          </a:fillRef>
+          <a:effectRef idx="0">
+            <a:schemeClr val="accent1"/>
+          </a:effectRef>
+          <a:fontRef idx="minor">
+            <a:schemeClr val="lt1"/>
+          </a:fontRef>
+        </p:style>
+        <p:txBody>
+          <a:bodyPr rtlCol="0" anchor="ctr"/>
+          <a:lstStyle/>
+          <a:p>
+            <a:pPr algn="ctr"/>
+            <a:endParaRPr lang="en-US">
+              <a:solidFill>
+                <a:prstClr val="white"/>
+              </a:solidFill>
+              <a:latin typeface="Calibri" panose="020F0502020204030204"/>
+            </a:endParaRPr>
+          </a:p>
+        </p:txBody>
+      </p:sp>
+      <p:sp>
+        <p:nvSpPr>
+          <p:cNvPr id="3" name="Content Placeholder 2">
+            <a:extLst>
+              <a:ext uri="{FF2B5EF4-FFF2-40B4-BE49-F238E27FC236}">
+                <a16:creationId xmlns:a16="http://schemas.microsoft.com/office/drawing/2014/main" id="{F995AFEC-8C2D-72B5-55E3-82084995289B}"/>
+              </a:ext>
+            </a:extLst>
+          </p:cNvPr>
+          <p:cNvSpPr>
+            <a:spLocks noGrp="1"/>
+          </p:cNvSpPr>
+          <p:nvPr>
+            <p:ph idx="1"/>
+          </p:nvPr>
+        </p:nvSpPr>
+        <p:spPr>
+          <a:xfrm>
+            <a:off x="836676" y="2481943"/>
+            <a:ext cx="7626096" cy="3695020"/>
+          </a:xfrm>
+        </p:spPr>
+        <p:txBody>
+          <a:bodyPr>
+            <a:normAutofit/>
+          </a:bodyPr>
+          <a:lstStyle/>
+          <a:p>
+            <a:r>
+              <a:rPr lang="en-US" dirty="0" err="1"/>
+              <a:t>PHPUnit</a:t>
+            </a:r>
+            <a:r>
+              <a:rPr lang="en-US" dirty="0"/>
+              <a:t> is a powerful testing framework for PHP that allows you to write unit tests for your code. With </a:t>
+            </a:r>
+            <a:r>
+              <a:rPr lang="en-US" dirty="0" err="1"/>
+              <a:t>PHPUnit</a:t>
+            </a:r>
+            <a:r>
+              <a:rPr lang="en-US" dirty="0"/>
+              <a:t>, you can test your code for correctness and ensure that it behaves as expected.</a:t>
+            </a:r>
+          </a:p>
+        </p:txBody>
+      </p:sp>
+    </p:spTree>
+    <p:extLst>
+      <p:ext uri="{BB962C8B-B14F-4D97-AF65-F5344CB8AC3E}">
+        <p14:creationId xmlns:p14="http://schemas.microsoft.com/office/powerpoint/2010/main" val="2153637426"/>
+      </p:ext>
+    </p:extLst>
   </p:cSld>
   <p:clrMapOvr>
     <a:masterClrMapping/>
@@ -7961,9 +10378,23 @@
 <file path=ppt/slides/slide8.xml><?xml version="1.0" encoding="utf-8"?>
 <p:sld xmlns:a="http://schemas.openxmlformats.org/drawingml/2006/main" xmlns:r="http://schemas.openxmlformats.org/officeDocument/2006/relationships" xmlns:p="http://schemas.openxmlformats.org/presentationml/2006/main">
   <p:cSld>
+    <p:bg>
+      <p:bgPr>
+        <a:solidFill>
+          <a:schemeClr val="bg1"/>
+        </a:solidFill>
+        <a:effectLst/>
+      </p:bgPr>
+    </p:bg>
     <p:spTree>
       <p:nvGrpSpPr>
-        <p:cNvPr id="1" name=""/>
+        <p:cNvPr id="1" name="">
+          <a:extLst>
+            <a:ext uri="{FF2B5EF4-FFF2-40B4-BE49-F238E27FC236}">
+              <a16:creationId xmlns:a16="http://schemas.microsoft.com/office/drawing/2014/main" id="{25F1D074-E4B6-C99D-15F7-5FACF3D44ACB}"/>
+            </a:ext>
+          </a:extLst>
+        </p:cNvPr>
         <p:cNvGrpSpPr/>
         <p:nvPr/>
       </p:nvGrpSpPr>
@@ -7975,9 +10406,264 @@
           <a:chExt cx="0" cy="0"/>
         </a:xfrm>
       </p:grpSpPr>
-      <p:sp>
-        <p:nvSpPr>
-          <p:cNvPr id="2" name="Title 1"/>
+      <p:sp useBgFill="1">
+        <p:nvSpPr>
+          <p:cNvPr id="8" name="Rectangle 7">
+            <a:extLst>
+              <a:ext uri="{FF2B5EF4-FFF2-40B4-BE49-F238E27FC236}">
+                <a16:creationId xmlns:a16="http://schemas.microsoft.com/office/drawing/2014/main" id="{958D1CB6-6E96-7DD5-B93F-408421EABAD7}"/>
+              </a:ext>
+              <a:ext uri="{C183D7F6-B498-43B3-948B-1728B52AA6E4}">
+                <adec:decorative xmlns:adec="http://schemas.microsoft.com/office/drawing/2017/decorative" val="1"/>
+              </a:ext>
+            </a:extLst>
+          </p:cNvPr>
+          <p:cNvSpPr>
+            <a:spLocks noGrp="1" noRot="1" noChangeAspect="1" noMove="1" noResize="1" noEditPoints="1" noAdjustHandles="1" noChangeArrowheads="1" noChangeShapeType="1" noTextEdit="1"/>
+          </p:cNvSpPr>
+          <p:nvPr>
+            <p:extLst>
+              <p:ext uri="{386F3935-93C4-4BCD-93E2-E3B085C9AB24}">
+                <p16:designElem xmlns:p16="http://schemas.microsoft.com/office/powerpoint/2015/main" val="1"/>
+              </p:ext>
+            </p:extLst>
+          </p:nvPr>
+        </p:nvSpPr>
+        <p:spPr>
+          <a:xfrm>
+            <a:off x="0" y="0"/>
+            <a:ext cx="9144000" cy="6858000"/>
+          </a:xfrm>
+          <a:prstGeom prst="rect">
+            <a:avLst/>
+          </a:prstGeom>
+          <a:ln>
+            <a:noFill/>
+          </a:ln>
+        </p:spPr>
+        <p:style>
+          <a:lnRef idx="2">
+            <a:schemeClr val="accent1">
+              <a:shade val="50000"/>
+            </a:schemeClr>
+          </a:lnRef>
+          <a:fillRef idx="1">
+            <a:schemeClr val="accent1"/>
+          </a:fillRef>
+          <a:effectRef idx="0">
+            <a:schemeClr val="accent1"/>
+          </a:effectRef>
+          <a:fontRef idx="minor">
+            <a:schemeClr val="lt1"/>
+          </a:fontRef>
+        </p:style>
+        <p:txBody>
+          <a:bodyPr rtlCol="0" anchor="ctr"/>
+          <a:lstStyle/>
+          <a:p>
+            <a:pPr algn="ctr"/>
+            <a:endParaRPr lang="en-US"/>
+          </a:p>
+        </p:txBody>
+      </p:sp>
+      <p:sp useBgFill="1">
+        <p:nvSpPr>
+          <p:cNvPr id="10" name="Rectangle 9">
+            <a:extLst>
+              <a:ext uri="{FF2B5EF4-FFF2-40B4-BE49-F238E27FC236}">
+                <a16:creationId xmlns:a16="http://schemas.microsoft.com/office/drawing/2014/main" id="{F883ACC5-DB83-56CE-4046-FED6D79927D0}"/>
+              </a:ext>
+              <a:ext uri="{C183D7F6-B498-43B3-948B-1728B52AA6E4}">
+                <adec:decorative xmlns:adec="http://schemas.microsoft.com/office/drawing/2017/decorative" val="1"/>
+              </a:ext>
+            </a:extLst>
+          </p:cNvPr>
+          <p:cNvSpPr>
+            <a:spLocks noGrp="1" noRot="1" noChangeAspect="1" noMove="1" noResize="1" noEditPoints="1" noAdjustHandles="1" noChangeArrowheads="1" noChangeShapeType="1" noTextEdit="1"/>
+          </p:cNvSpPr>
+          <p:nvPr>
+            <p:extLst>
+              <p:ext uri="{386F3935-93C4-4BCD-93E2-E3B085C9AB24}">
+                <p16:designElem xmlns:p16="http://schemas.microsoft.com/office/powerpoint/2015/main" val="1"/>
+              </p:ext>
+            </p:extLst>
+          </p:nvPr>
+        </p:nvSpPr>
+        <p:spPr>
+          <a:xfrm>
+            <a:off x="418656" y="0"/>
+            <a:ext cx="8375586" cy="2018806"/>
+          </a:xfrm>
+          <a:prstGeom prst="rect">
+            <a:avLst/>
+          </a:prstGeom>
+          <a:ln w="9525">
+            <a:solidFill>
+              <a:srgbClr val="E1E1E1"/>
+            </a:solidFill>
+          </a:ln>
+          <a:effectLst>
+            <a:outerShdw blurRad="50800" dist="38100" dir="2700000" algn="tl" rotWithShape="0">
+              <a:schemeClr val="bg1">
+                <a:lumMod val="85000"/>
+                <a:alpha val="50000"/>
+              </a:schemeClr>
+            </a:outerShdw>
+          </a:effectLst>
+        </p:spPr>
+        <p:style>
+          <a:lnRef idx="2">
+            <a:schemeClr val="accent1">
+              <a:shade val="50000"/>
+            </a:schemeClr>
+          </a:lnRef>
+          <a:fillRef idx="1">
+            <a:schemeClr val="accent1"/>
+          </a:fillRef>
+          <a:effectRef idx="0">
+            <a:schemeClr val="accent1"/>
+          </a:effectRef>
+          <a:fontRef idx="minor">
+            <a:schemeClr val="lt1"/>
+          </a:fontRef>
+        </p:style>
+        <p:txBody>
+          <a:bodyPr rtlCol="0" anchor="ctr"/>
+          <a:lstStyle/>
+          <a:p>
+            <a:pPr marL="0" marR="0" lvl="0" indent="0" algn="ctr" defTabSz="914400" rtl="0" eaLnBrk="1" fontAlgn="auto" latinLnBrk="0" hangingPunct="1">
+              <a:lnSpc>
+                <a:spcPct val="100000"/>
+              </a:lnSpc>
+              <a:spcBef>
+                <a:spcPts val="0"/>
+              </a:spcBef>
+              <a:spcAft>
+                <a:spcPts val="0"/>
+              </a:spcAft>
+              <a:buClrTx/>
+              <a:buSzTx/>
+              <a:buFontTx/>
+              <a:buNone/>
+              <a:tabLst/>
+              <a:defRPr/>
+            </a:pPr>
+            <a:endParaRPr kumimoji="0" lang="en-US" sz="1800" b="0" i="0" u="none" strike="noStrike" kern="1200" cap="none" spc="0" normalizeH="0" baseline="0" noProof="0">
+              <a:ln>
+                <a:noFill/>
+              </a:ln>
+              <a:solidFill>
+                <a:prstClr val="white"/>
+              </a:solidFill>
+              <a:effectLst/>
+              <a:uLnTx/>
+              <a:uFillTx/>
+              <a:latin typeface="Calibri" panose="020F0502020204030204"/>
+              <a:ea typeface="+mn-ea"/>
+              <a:cs typeface="+mn-cs"/>
+            </a:endParaRPr>
+          </a:p>
+        </p:txBody>
+      </p:sp>
+      <p:sp useBgFill="1">
+        <p:nvSpPr>
+          <p:cNvPr id="12" name="Rectangle 11">
+            <a:extLst>
+              <a:ext uri="{FF2B5EF4-FFF2-40B4-BE49-F238E27FC236}">
+                <a16:creationId xmlns:a16="http://schemas.microsoft.com/office/drawing/2014/main" id="{A4F52E42-AFBB-427E-D172-2363BA5D3FDC}"/>
+              </a:ext>
+              <a:ext uri="{C183D7F6-B498-43B3-948B-1728B52AA6E4}">
+                <adec:decorative xmlns:adec="http://schemas.microsoft.com/office/drawing/2017/decorative" val="1"/>
+              </a:ext>
+            </a:extLst>
+          </p:cNvPr>
+          <p:cNvSpPr>
+            <a:spLocks noGrp="1" noRot="1" noChangeAspect="1" noMove="1" noResize="1" noEditPoints="1" noAdjustHandles="1" noChangeArrowheads="1" noChangeShapeType="1" noTextEdit="1"/>
+          </p:cNvSpPr>
+          <p:nvPr>
+            <p:extLst>
+              <p:ext uri="{386F3935-93C4-4BCD-93E2-E3B085C9AB24}">
+                <p16:designElem xmlns:p16="http://schemas.microsoft.com/office/powerpoint/2015/main" val="1"/>
+              </p:ext>
+            </p:extLst>
+          </p:nvPr>
+        </p:nvSpPr>
+        <p:spPr>
+          <a:xfrm>
+            <a:off x="425196" y="0"/>
+            <a:ext cx="8366760" cy="2011680"/>
+          </a:xfrm>
+          <a:prstGeom prst="rect">
+            <a:avLst/>
+          </a:prstGeom>
+          <a:ln w="9525">
+            <a:noFill/>
+          </a:ln>
+          <a:effectLst/>
+        </p:spPr>
+        <p:style>
+          <a:lnRef idx="2">
+            <a:schemeClr val="accent1">
+              <a:shade val="50000"/>
+            </a:schemeClr>
+          </a:lnRef>
+          <a:fillRef idx="1">
+            <a:schemeClr val="accent1"/>
+          </a:fillRef>
+          <a:effectRef idx="0">
+            <a:schemeClr val="accent1"/>
+          </a:effectRef>
+          <a:fontRef idx="minor">
+            <a:schemeClr val="lt1"/>
+          </a:fontRef>
+        </p:style>
+        <p:txBody>
+          <a:bodyPr rtlCol="0" anchor="ctr"/>
+          <a:lstStyle/>
+          <a:p>
+            <a:pPr marL="0" marR="0" lvl="0" indent="0" algn="ctr" defTabSz="914400" rtl="0" eaLnBrk="1" fontAlgn="auto" latinLnBrk="0" hangingPunct="1">
+              <a:lnSpc>
+                <a:spcPct val="100000"/>
+              </a:lnSpc>
+              <a:spcBef>
+                <a:spcPts val="0"/>
+              </a:spcBef>
+              <a:spcAft>
+                <a:spcPts val="0"/>
+              </a:spcAft>
+              <a:buClrTx/>
+              <a:buSzTx/>
+              <a:buFontTx/>
+              <a:buNone/>
+              <a:tabLst/>
+              <a:defRPr/>
+            </a:pPr>
+            <a:endParaRPr kumimoji="0" lang="en-US" sz="1800" b="0" i="0" u="none" strike="noStrike" kern="1200" cap="none" spc="0" normalizeH="0" baseline="0" noProof="0">
+              <a:ln>
+                <a:noFill/>
+              </a:ln>
+              <a:solidFill>
+                <a:prstClr val="white"/>
+              </a:solidFill>
+              <a:effectLst/>
+              <a:uLnTx/>
+              <a:uFillTx/>
+              <a:latin typeface="Calibri" panose="020F0502020204030204"/>
+              <a:ea typeface="+mn-ea"/>
+              <a:cs typeface="+mn-cs"/>
+            </a:endParaRPr>
+          </a:p>
+        </p:txBody>
+      </p:sp>
+      <p:sp>
+        <p:nvSpPr>
+          <p:cNvPr id="2" name="Title 1">
+            <a:extLst>
+              <a:ext uri="{FF2B5EF4-FFF2-40B4-BE49-F238E27FC236}">
+                <a16:creationId xmlns:a16="http://schemas.microsoft.com/office/drawing/2014/main" id="{E908F172-7AAE-159F-B5C4-D43FA35F13E0}"/>
+              </a:ext>
+            </a:extLst>
+          </p:cNvPr>
           <p:cNvSpPr>
             <a:spLocks noGrp="1"/>
           </p:cNvSpPr>
@@ -7985,20 +10671,104 @@
             <p:ph type="title"/>
           </p:nvPr>
         </p:nvSpPr>
-        <p:spPr/>
-        <p:txBody>
-          <a:bodyPr/>
-          <a:lstStyle/>
-          <a:p>
-            <a:r>
-              <a:t>▶️ Running Unit Tests</a:t>
-            </a:r>
-          </a:p>
-        </p:txBody>
-      </p:sp>
-      <p:sp>
-        <p:nvSpPr>
-          <p:cNvPr id="3" name="Content Placeholder 2"/>
+        <p:spPr>
+          <a:xfrm>
+            <a:off x="888793" y="842793"/>
+            <a:ext cx="7626096" cy="1179576"/>
+          </a:xfrm>
+        </p:spPr>
+        <p:txBody>
+          <a:bodyPr>
+            <a:noAutofit/>
+          </a:bodyPr>
+          <a:lstStyle/>
+          <a:p>
+            <a:pPr fontAlgn="base"/>
+            <a:r>
+              <a:rPr lang="en-US" sz="3600" dirty="0"/>
+              <a:t> Running Unit Tests</a:t>
+            </a:r>
+            <a:endParaRPr lang="en-US" sz="3500" dirty="0"/>
+          </a:p>
+        </p:txBody>
+      </p:sp>
+      <p:sp>
+        <p:nvSpPr>
+          <p:cNvPr id="14" name="Rectangle 13">
+            <a:extLst>
+              <a:ext uri="{FF2B5EF4-FFF2-40B4-BE49-F238E27FC236}">
+                <a16:creationId xmlns:a16="http://schemas.microsoft.com/office/drawing/2014/main" id="{DBC241E6-B57C-D52F-0B91-25BEC7B09E31}"/>
+              </a:ext>
+              <a:ext uri="{C183D7F6-B498-43B3-948B-1728B52AA6E4}">
+                <adec:decorative xmlns:adec="http://schemas.microsoft.com/office/drawing/2017/decorative" val="1"/>
+              </a:ext>
+            </a:extLst>
+          </p:cNvPr>
+          <p:cNvSpPr>
+            <a:spLocks noGrp="1" noRot="1" noChangeAspect="1" noMove="1" noResize="1" noEditPoints="1" noAdjustHandles="1" noChangeArrowheads="1" noChangeShapeType="1" noTextEdit="1"/>
+          </p:cNvSpPr>
+          <p:nvPr>
+            <p:extLst>
+              <p:ext uri="{386F3935-93C4-4BCD-93E2-E3B085C9AB24}">
+                <p16:designElem xmlns:p16="http://schemas.microsoft.com/office/powerpoint/2015/main" val="1"/>
+              </p:ext>
+            </p:extLst>
+          </p:nvPr>
+        </p:nvSpPr>
+        <p:spPr>
+          <a:xfrm>
+            <a:off x="374125" y="758952"/>
+            <a:ext cx="96012" cy="704088"/>
+          </a:xfrm>
+          <a:prstGeom prst="rect">
+            <a:avLst/>
+          </a:prstGeom>
+          <a:solidFill>
+            <a:schemeClr val="accent2"/>
+          </a:solidFill>
+          <a:ln>
+            <a:noFill/>
+          </a:ln>
+        </p:spPr>
+        <p:style>
+          <a:lnRef idx="2">
+            <a:schemeClr val="accent1">
+              <a:shade val="50000"/>
+            </a:schemeClr>
+          </a:lnRef>
+          <a:fillRef idx="1">
+            <a:schemeClr val="accent1"/>
+          </a:fillRef>
+          <a:effectRef idx="0">
+            <a:schemeClr val="accent1"/>
+          </a:effectRef>
+          <a:fontRef idx="minor">
+            <a:schemeClr val="lt1"/>
+          </a:fontRef>
+        </p:style>
+        <p:txBody>
+          <a:bodyPr rtlCol="0" anchor="ctr"/>
+          <a:lstStyle/>
+          <a:p>
+            <a:pPr algn="ctr"/>
+            <a:endParaRPr lang="en-US">
+              <a:solidFill>
+                <a:prstClr val="white"/>
+              </a:solidFill>
+              <a:latin typeface="Calibri" panose="020F0502020204030204"/>
+            </a:endParaRPr>
+          </a:p>
+        </p:txBody>
+      </p:sp>
+      <p:sp>
+        <p:nvSpPr>
+          <p:cNvPr id="3" name="Content Placeholder 2">
+            <a:extLst>
+              <a:ext uri="{FF2B5EF4-FFF2-40B4-BE49-F238E27FC236}">
+                <a16:creationId xmlns:a16="http://schemas.microsoft.com/office/drawing/2014/main" id="{E7234B20-DBA0-B358-8DC0-CB165FA4B4B6}"/>
+              </a:ext>
+            </a:extLst>
+          </p:cNvPr>
           <p:cNvSpPr>
             <a:spLocks noGrp="1"/>
           </p:cNvSpPr>
@@ -8006,23 +10776,42 @@
             <p:ph idx="1"/>
           </p:nvPr>
         </p:nvSpPr>
-        <p:spPr/>
-        <p:txBody>
-          <a:bodyPr/>
-          <a:lstStyle/>
-          <a:p>
-            <a:r>
-              <a:t>Run command: ./vendor/bin/phpunit</a:t>
-            </a:r>
-          </a:p>
-          <a:p>
-            <a:r>
+        <p:spPr>
+          <a:xfrm>
+            <a:off x="836676" y="2481943"/>
+            <a:ext cx="7626096" cy="3695020"/>
+          </a:xfrm>
+        </p:spPr>
+        <p:txBody>
+          <a:bodyPr>
+            <a:normAutofit/>
+          </a:bodyPr>
+          <a:lstStyle/>
+          <a:p>
+            <a:r>
+              <a:rPr lang="en-US" dirty="0"/>
+              <a:t>Run command: ./vendor/bin/</a:t>
+            </a:r>
+            <a:r>
+              <a:rPr lang="en-US" dirty="0" err="1"/>
+              <a:t>phpunit</a:t>
+            </a:r>
+            <a:endParaRPr lang="en-US" dirty="0"/>
+          </a:p>
+          <a:p>
+            <a:r>
+              <a:rPr lang="en-US" dirty="0"/>
               <a:t>Output example: OK (1 test, 1 assertion)</a:t>
             </a:r>
           </a:p>
         </p:txBody>
       </p:sp>
     </p:spTree>
+    <p:extLst>
+      <p:ext uri="{BB962C8B-B14F-4D97-AF65-F5344CB8AC3E}">
+        <p14:creationId xmlns:p14="http://schemas.microsoft.com/office/powerpoint/2010/main" val="2578651116"/>
+      </p:ext>
+    </p:extLst>
   </p:cSld>
   <p:clrMapOvr>
     <a:masterClrMapping/>
@@ -8033,9 +10822,23 @@
 <file path=ppt/slides/slide9.xml><?xml version="1.0" encoding="utf-8"?>
 <p:sld xmlns:a="http://schemas.openxmlformats.org/drawingml/2006/main" xmlns:r="http://schemas.openxmlformats.org/officeDocument/2006/relationships" xmlns:p="http://schemas.openxmlformats.org/presentationml/2006/main">
   <p:cSld>
+    <p:bg>
+      <p:bgPr>
+        <a:solidFill>
+          <a:schemeClr val="bg1"/>
+        </a:solidFill>
+        <a:effectLst/>
+      </p:bgPr>
+    </p:bg>
     <p:spTree>
       <p:nvGrpSpPr>
-        <p:cNvPr id="1" name=""/>
+        <p:cNvPr id="1" name="">
+          <a:extLst>
+            <a:ext uri="{FF2B5EF4-FFF2-40B4-BE49-F238E27FC236}">
+              <a16:creationId xmlns:a16="http://schemas.microsoft.com/office/drawing/2014/main" id="{0E691B09-E655-6118-EDB1-94BEAAB173B3}"/>
+            </a:ext>
+          </a:extLst>
+        </p:cNvPr>
         <p:cNvGrpSpPr/>
         <p:nvPr/>
       </p:nvGrpSpPr>
@@ -8047,9 +10850,264 @@
           <a:chExt cx="0" cy="0"/>
         </a:xfrm>
       </p:grpSpPr>
-      <p:sp>
-        <p:nvSpPr>
-          <p:cNvPr id="2" name="Title 1"/>
+      <p:sp useBgFill="1">
+        <p:nvSpPr>
+          <p:cNvPr id="8" name="Rectangle 7">
+            <a:extLst>
+              <a:ext uri="{FF2B5EF4-FFF2-40B4-BE49-F238E27FC236}">
+                <a16:creationId xmlns:a16="http://schemas.microsoft.com/office/drawing/2014/main" id="{83B21ED0-DEF2-AF67-3278-4BA6695A52F2}"/>
+              </a:ext>
+              <a:ext uri="{C183D7F6-B498-43B3-948B-1728B52AA6E4}">
+                <adec:decorative xmlns:adec="http://schemas.microsoft.com/office/drawing/2017/decorative" val="1"/>
+              </a:ext>
+            </a:extLst>
+          </p:cNvPr>
+          <p:cNvSpPr>
+            <a:spLocks noGrp="1" noRot="1" noChangeAspect="1" noMove="1" noResize="1" noEditPoints="1" noAdjustHandles="1" noChangeArrowheads="1" noChangeShapeType="1" noTextEdit="1"/>
+          </p:cNvSpPr>
+          <p:nvPr>
+            <p:extLst>
+              <p:ext uri="{386F3935-93C4-4BCD-93E2-E3B085C9AB24}">
+                <p16:designElem xmlns:p16="http://schemas.microsoft.com/office/powerpoint/2015/main" val="1"/>
+              </p:ext>
+            </p:extLst>
+          </p:nvPr>
+        </p:nvSpPr>
+        <p:spPr>
+          <a:xfrm>
+            <a:off x="0" y="0"/>
+            <a:ext cx="9144000" cy="6858000"/>
+          </a:xfrm>
+          <a:prstGeom prst="rect">
+            <a:avLst/>
+          </a:prstGeom>
+          <a:ln>
+            <a:noFill/>
+          </a:ln>
+        </p:spPr>
+        <p:style>
+          <a:lnRef idx="2">
+            <a:schemeClr val="accent1">
+              <a:shade val="50000"/>
+            </a:schemeClr>
+          </a:lnRef>
+          <a:fillRef idx="1">
+            <a:schemeClr val="accent1"/>
+          </a:fillRef>
+          <a:effectRef idx="0">
+            <a:schemeClr val="accent1"/>
+          </a:effectRef>
+          <a:fontRef idx="minor">
+            <a:schemeClr val="lt1"/>
+          </a:fontRef>
+        </p:style>
+        <p:txBody>
+          <a:bodyPr rtlCol="0" anchor="ctr"/>
+          <a:lstStyle/>
+          <a:p>
+            <a:pPr algn="ctr"/>
+            <a:endParaRPr lang="en-US"/>
+          </a:p>
+        </p:txBody>
+      </p:sp>
+      <p:sp useBgFill="1">
+        <p:nvSpPr>
+          <p:cNvPr id="10" name="Rectangle 9">
+            <a:extLst>
+              <a:ext uri="{FF2B5EF4-FFF2-40B4-BE49-F238E27FC236}">
+                <a16:creationId xmlns:a16="http://schemas.microsoft.com/office/drawing/2014/main" id="{E08780AB-45AA-EA3C-015A-D103297B369F}"/>
+              </a:ext>
+              <a:ext uri="{C183D7F6-B498-43B3-948B-1728B52AA6E4}">
+                <adec:decorative xmlns:adec="http://schemas.microsoft.com/office/drawing/2017/decorative" val="1"/>
+              </a:ext>
+            </a:extLst>
+          </p:cNvPr>
+          <p:cNvSpPr>
+            <a:spLocks noGrp="1" noRot="1" noChangeAspect="1" noMove="1" noResize="1" noEditPoints="1" noAdjustHandles="1" noChangeArrowheads="1" noChangeShapeType="1" noTextEdit="1"/>
+          </p:cNvSpPr>
+          <p:nvPr>
+            <p:extLst>
+              <p:ext uri="{386F3935-93C4-4BCD-93E2-E3B085C9AB24}">
+                <p16:designElem xmlns:p16="http://schemas.microsoft.com/office/powerpoint/2015/main" val="1"/>
+              </p:ext>
+            </p:extLst>
+          </p:nvPr>
+        </p:nvSpPr>
+        <p:spPr>
+          <a:xfrm>
+            <a:off x="418656" y="0"/>
+            <a:ext cx="8375586" cy="2018806"/>
+          </a:xfrm>
+          <a:prstGeom prst="rect">
+            <a:avLst/>
+          </a:prstGeom>
+          <a:ln w="9525">
+            <a:solidFill>
+              <a:srgbClr val="E1E1E1"/>
+            </a:solidFill>
+          </a:ln>
+          <a:effectLst>
+            <a:outerShdw blurRad="50800" dist="38100" dir="2700000" algn="tl" rotWithShape="0">
+              <a:schemeClr val="bg1">
+                <a:lumMod val="85000"/>
+                <a:alpha val="50000"/>
+              </a:schemeClr>
+            </a:outerShdw>
+          </a:effectLst>
+        </p:spPr>
+        <p:style>
+          <a:lnRef idx="2">
+            <a:schemeClr val="accent1">
+              <a:shade val="50000"/>
+            </a:schemeClr>
+          </a:lnRef>
+          <a:fillRef idx="1">
+            <a:schemeClr val="accent1"/>
+          </a:fillRef>
+          <a:effectRef idx="0">
+            <a:schemeClr val="accent1"/>
+          </a:effectRef>
+          <a:fontRef idx="minor">
+            <a:schemeClr val="lt1"/>
+          </a:fontRef>
+        </p:style>
+        <p:txBody>
+          <a:bodyPr rtlCol="0" anchor="ctr"/>
+          <a:lstStyle/>
+          <a:p>
+            <a:pPr marL="0" marR="0" lvl="0" indent="0" algn="ctr" defTabSz="914400" rtl="0" eaLnBrk="1" fontAlgn="auto" latinLnBrk="0" hangingPunct="1">
+              <a:lnSpc>
+                <a:spcPct val="100000"/>
+              </a:lnSpc>
+              <a:spcBef>
+                <a:spcPts val="0"/>
+              </a:spcBef>
+              <a:spcAft>
+                <a:spcPts val="0"/>
+              </a:spcAft>
+              <a:buClrTx/>
+              <a:buSzTx/>
+              <a:buFontTx/>
+              <a:buNone/>
+              <a:tabLst/>
+              <a:defRPr/>
+            </a:pPr>
+            <a:endParaRPr kumimoji="0" lang="en-US" sz="1800" b="0" i="0" u="none" strike="noStrike" kern="1200" cap="none" spc="0" normalizeH="0" baseline="0" noProof="0">
+              <a:ln>
+                <a:noFill/>
+              </a:ln>
+              <a:solidFill>
+                <a:prstClr val="white"/>
+              </a:solidFill>
+              <a:effectLst/>
+              <a:uLnTx/>
+              <a:uFillTx/>
+              <a:latin typeface="Calibri" panose="020F0502020204030204"/>
+              <a:ea typeface="+mn-ea"/>
+              <a:cs typeface="+mn-cs"/>
+            </a:endParaRPr>
+          </a:p>
+        </p:txBody>
+      </p:sp>
+      <p:sp useBgFill="1">
+        <p:nvSpPr>
+          <p:cNvPr id="12" name="Rectangle 11">
+            <a:extLst>
+              <a:ext uri="{FF2B5EF4-FFF2-40B4-BE49-F238E27FC236}">
+                <a16:creationId xmlns:a16="http://schemas.microsoft.com/office/drawing/2014/main" id="{6D57DC46-A75B-D1AB-A054-E5D98729CBE0}"/>
+              </a:ext>
+              <a:ext uri="{C183D7F6-B498-43B3-948B-1728B52AA6E4}">
+                <adec:decorative xmlns:adec="http://schemas.microsoft.com/office/drawing/2017/decorative" val="1"/>
+              </a:ext>
+            </a:extLst>
+          </p:cNvPr>
+          <p:cNvSpPr>
+            <a:spLocks noGrp="1" noRot="1" noChangeAspect="1" noMove="1" noResize="1" noEditPoints="1" noAdjustHandles="1" noChangeArrowheads="1" noChangeShapeType="1" noTextEdit="1"/>
+          </p:cNvSpPr>
+          <p:nvPr>
+            <p:extLst>
+              <p:ext uri="{386F3935-93C4-4BCD-93E2-E3B085C9AB24}">
+                <p16:designElem xmlns:p16="http://schemas.microsoft.com/office/powerpoint/2015/main" val="1"/>
+              </p:ext>
+            </p:extLst>
+          </p:nvPr>
+        </p:nvSpPr>
+        <p:spPr>
+          <a:xfrm>
+            <a:off x="425196" y="0"/>
+            <a:ext cx="8366760" cy="2011680"/>
+          </a:xfrm>
+          <a:prstGeom prst="rect">
+            <a:avLst/>
+          </a:prstGeom>
+          <a:ln w="9525">
+            <a:noFill/>
+          </a:ln>
+          <a:effectLst/>
+        </p:spPr>
+        <p:style>
+          <a:lnRef idx="2">
+            <a:schemeClr val="accent1">
+              <a:shade val="50000"/>
+            </a:schemeClr>
+          </a:lnRef>
+          <a:fillRef idx="1">
+            <a:schemeClr val="accent1"/>
+          </a:fillRef>
+          <a:effectRef idx="0">
+            <a:schemeClr val="accent1"/>
+          </a:effectRef>
+          <a:fontRef idx="minor">
+            <a:schemeClr val="lt1"/>
+          </a:fontRef>
+        </p:style>
+        <p:txBody>
+          <a:bodyPr rtlCol="0" anchor="ctr"/>
+          <a:lstStyle/>
+          <a:p>
+            <a:pPr marL="0" marR="0" lvl="0" indent="0" algn="ctr" defTabSz="914400" rtl="0" eaLnBrk="1" fontAlgn="auto" latinLnBrk="0" hangingPunct="1">
+              <a:lnSpc>
+                <a:spcPct val="100000"/>
+              </a:lnSpc>
+              <a:spcBef>
+                <a:spcPts val="0"/>
+              </a:spcBef>
+              <a:spcAft>
+                <a:spcPts val="0"/>
+              </a:spcAft>
+              <a:buClrTx/>
+              <a:buSzTx/>
+              <a:buFontTx/>
+              <a:buNone/>
+              <a:tabLst/>
+              <a:defRPr/>
+            </a:pPr>
+            <a:endParaRPr kumimoji="0" lang="en-US" sz="1800" b="0" i="0" u="none" strike="noStrike" kern="1200" cap="none" spc="0" normalizeH="0" baseline="0" noProof="0">
+              <a:ln>
+                <a:noFill/>
+              </a:ln>
+              <a:solidFill>
+                <a:prstClr val="white"/>
+              </a:solidFill>
+              <a:effectLst/>
+              <a:uLnTx/>
+              <a:uFillTx/>
+              <a:latin typeface="Calibri" panose="020F0502020204030204"/>
+              <a:ea typeface="+mn-ea"/>
+              <a:cs typeface="+mn-cs"/>
+            </a:endParaRPr>
+          </a:p>
+        </p:txBody>
+      </p:sp>
+      <p:sp>
+        <p:nvSpPr>
+          <p:cNvPr id="2" name="Title 1">
+            <a:extLst>
+              <a:ext uri="{FF2B5EF4-FFF2-40B4-BE49-F238E27FC236}">
+                <a16:creationId xmlns:a16="http://schemas.microsoft.com/office/drawing/2014/main" id="{88850F93-89F9-C847-53C5-BCFE6F7420E4}"/>
+              </a:ext>
+            </a:extLst>
+          </p:cNvPr>
           <p:cNvSpPr>
             <a:spLocks noGrp="1"/>
           </p:cNvSpPr>
@@ -8057,20 +11115,104 @@
             <p:ph type="title"/>
           </p:nvPr>
         </p:nvSpPr>
-        <p:spPr/>
-        <p:txBody>
-          <a:bodyPr/>
-          <a:lstStyle/>
-          <a:p>
-            <a:r>
-              <a:t>✅ Common Assertions</a:t>
-            </a:r>
-          </a:p>
-        </p:txBody>
-      </p:sp>
-      <p:sp>
-        <p:nvSpPr>
-          <p:cNvPr id="3" name="Content Placeholder 2"/>
+        <p:spPr>
+          <a:xfrm>
+            <a:off x="888793" y="842793"/>
+            <a:ext cx="7626096" cy="1179576"/>
+          </a:xfrm>
+        </p:spPr>
+        <p:txBody>
+          <a:bodyPr>
+            <a:noAutofit/>
+          </a:bodyPr>
+          <a:lstStyle/>
+          <a:p>
+            <a:pPr fontAlgn="base"/>
+            <a:r>
+              <a:rPr lang="en-US" sz="3600" dirty="0"/>
+              <a:t>Common Assertions</a:t>
+            </a:r>
+            <a:endParaRPr lang="en-US" sz="3500" dirty="0"/>
+          </a:p>
+        </p:txBody>
+      </p:sp>
+      <p:sp>
+        <p:nvSpPr>
+          <p:cNvPr id="14" name="Rectangle 13">
+            <a:extLst>
+              <a:ext uri="{FF2B5EF4-FFF2-40B4-BE49-F238E27FC236}">
+                <a16:creationId xmlns:a16="http://schemas.microsoft.com/office/drawing/2014/main" id="{DF943225-2E31-32B7-9A60-0839662F15B5}"/>
+              </a:ext>
+              <a:ext uri="{C183D7F6-B498-43B3-948B-1728B52AA6E4}">
+                <adec:decorative xmlns:adec="http://schemas.microsoft.com/office/drawing/2017/decorative" val="1"/>
+              </a:ext>
+            </a:extLst>
+          </p:cNvPr>
+          <p:cNvSpPr>
+            <a:spLocks noGrp="1" noRot="1" noChangeAspect="1" noMove="1" noResize="1" noEditPoints="1" noAdjustHandles="1" noChangeArrowheads="1" noChangeShapeType="1" noTextEdit="1"/>
+          </p:cNvSpPr>
+          <p:nvPr>
+            <p:extLst>
+              <p:ext uri="{386F3935-93C4-4BCD-93E2-E3B085C9AB24}">
+                <p16:designElem xmlns:p16="http://schemas.microsoft.com/office/powerpoint/2015/main" val="1"/>
+              </p:ext>
+            </p:extLst>
+          </p:nvPr>
+        </p:nvSpPr>
+        <p:spPr>
+          <a:xfrm>
+            <a:off x="374125" y="758952"/>
+            <a:ext cx="96012" cy="704088"/>
+          </a:xfrm>
+          <a:prstGeom prst="rect">
+            <a:avLst/>
+          </a:prstGeom>
+          <a:solidFill>
+            <a:schemeClr val="accent2"/>
+          </a:solidFill>
+          <a:ln>
+            <a:noFill/>
+          </a:ln>
+        </p:spPr>
+        <p:style>
+          <a:lnRef idx="2">
+            <a:schemeClr val="accent1">
+              <a:shade val="50000"/>
+            </a:schemeClr>
+          </a:lnRef>
+          <a:fillRef idx="1">
+            <a:schemeClr val="accent1"/>
+          </a:fillRef>
+          <a:effectRef idx="0">
+            <a:schemeClr val="accent1"/>
+          </a:effectRef>
+          <a:fontRef idx="minor">
+            <a:schemeClr val="lt1"/>
+          </a:fontRef>
+        </p:style>
+        <p:txBody>
+          <a:bodyPr rtlCol="0" anchor="ctr"/>
+          <a:lstStyle/>
+          <a:p>
+            <a:pPr algn="ctr"/>
+            <a:endParaRPr lang="en-US">
+              <a:solidFill>
+                <a:prstClr val="white"/>
+              </a:solidFill>
+              <a:latin typeface="Calibri" panose="020F0502020204030204"/>
+            </a:endParaRPr>
+          </a:p>
+        </p:txBody>
+      </p:sp>
+      <p:sp>
+        <p:nvSpPr>
+          <p:cNvPr id="3" name="Content Placeholder 2">
+            <a:extLst>
+              <a:ext uri="{FF2B5EF4-FFF2-40B4-BE49-F238E27FC236}">
+                <a16:creationId xmlns:a16="http://schemas.microsoft.com/office/drawing/2014/main" id="{66837653-2EC4-9601-3298-D165A17B077D}"/>
+              </a:ext>
+            </a:extLst>
+          </p:cNvPr>
           <p:cNvSpPr>
             <a:spLocks noGrp="1"/>
           </p:cNvSpPr>
@@ -8078,33 +11220,73 @@
             <p:ph idx="1"/>
           </p:nvPr>
         </p:nvSpPr>
-        <p:spPr/>
-        <p:txBody>
-          <a:bodyPr/>
-          <a:lstStyle/>
-          <a:p>
-            <a:r>
-              <a:t>assertEquals() - Checks equality</a:t>
-            </a:r>
-          </a:p>
-          <a:p>
-            <a:r>
-              <a:t>assertTrue() / assertFalse()</a:t>
-            </a:r>
-          </a:p>
-          <a:p>
-            <a:r>
-              <a:t>assertNull() - Checks for null</a:t>
-            </a:r>
-          </a:p>
-          <a:p>
-            <a:r>
-              <a:t>assertInstanceOf() - Checks class type</a:t>
+        <p:spPr>
+          <a:xfrm>
+            <a:off x="836676" y="2481943"/>
+            <a:ext cx="7626096" cy="3695020"/>
+          </a:xfrm>
+        </p:spPr>
+        <p:txBody>
+          <a:bodyPr>
+            <a:normAutofit/>
+          </a:bodyPr>
+          <a:lstStyle/>
+          <a:p>
+            <a:r>
+              <a:rPr lang="en-US" dirty="0" err="1"/>
+              <a:t>assertEquals</a:t>
+            </a:r>
+            <a:r>
+              <a:rPr lang="en-US" dirty="0"/>
+              <a:t>() - Checks equality</a:t>
+            </a:r>
+          </a:p>
+          <a:p>
+            <a:r>
+              <a:rPr lang="en-US" dirty="0" err="1"/>
+              <a:t>assertTrue</a:t>
+            </a:r>
+            <a:r>
+              <a:rPr lang="en-US" dirty="0"/>
+              <a:t>() / </a:t>
+            </a:r>
+            <a:r>
+              <a:rPr lang="en-US" dirty="0" err="1"/>
+              <a:t>assertFalse</a:t>
+            </a:r>
+            <a:r>
+              <a:rPr lang="en-US" dirty="0"/>
+              <a:t>()</a:t>
+            </a:r>
+          </a:p>
+          <a:p>
+            <a:r>
+              <a:rPr lang="en-US" dirty="0" err="1"/>
+              <a:t>assertNull</a:t>
+            </a:r>
+            <a:r>
+              <a:rPr lang="en-US" dirty="0"/>
+              <a:t>() - Checks for null</a:t>
+            </a:r>
+          </a:p>
+          <a:p>
+            <a:r>
+              <a:rPr lang="en-US" dirty="0" err="1"/>
+              <a:t>assertInstanceOf</a:t>
+            </a:r>
+            <a:r>
+              <a:rPr lang="en-US" dirty="0"/>
+              <a:t>() - Checks class type</a:t>
             </a:r>
           </a:p>
         </p:txBody>
       </p:sp>
     </p:spTree>
+    <p:extLst>
+      <p:ext uri="{BB962C8B-B14F-4D97-AF65-F5344CB8AC3E}">
+        <p14:creationId xmlns:p14="http://schemas.microsoft.com/office/powerpoint/2010/main" val="144643554"/>
+      </p:ext>
+    </p:extLst>
   </p:cSld>
   <p:clrMapOvr>
     <a:masterClrMapping/>

</xml_diff>